<commit_message>
Update slide deck on leadership training Rationale: Add slide on problem solving
</commit_message>
<xml_diff>
--- a/2. Design and Development/DOC-202 - Training Leadership.pptx
+++ b/2. Design and Development/DOC-202 - Training Leadership.pptx
@@ -5,7 +5,7 @@
     <p:sldMasterId id="2147483648" r:id="rId1"/>
   </p:sldMasterIdLst>
   <p:notesMasterIdLst>
-    <p:notesMasterId r:id="rId26"/>
+    <p:notesMasterId r:id="rId27"/>
   </p:notesMasterIdLst>
   <p:sldIdLst>
     <p:sldId id="256" r:id="rId2"/>
@@ -28,10 +28,11 @@
     <p:sldId id="281" r:id="rId19"/>
     <p:sldId id="288" r:id="rId20"/>
     <p:sldId id="283" r:id="rId21"/>
-    <p:sldId id="286" r:id="rId22"/>
-    <p:sldId id="287" r:id="rId23"/>
-    <p:sldId id="282" r:id="rId24"/>
-    <p:sldId id="284" r:id="rId25"/>
+    <p:sldId id="292" r:id="rId22"/>
+    <p:sldId id="286" r:id="rId23"/>
+    <p:sldId id="287" r:id="rId24"/>
+    <p:sldId id="282" r:id="rId25"/>
+    <p:sldId id="284" r:id="rId26"/>
   </p:sldIdLst>
   <p:sldSz cx="12192000" cy="6858000"/>
   <p:notesSz cx="6858000" cy="9144000"/>
@@ -220,7 +221,7 @@
           <a:p>
             <a:fld id="{5464E162-CBEC-4925-93AE-447FF31D8791}" type="datetimeFigureOut">
               <a:rPr lang="en-US" smtClean="0"/>
-              <a:t>6/18/24</a:t>
+              <a:t>6/20/24</a:t>
             </a:fld>
             <a:endParaRPr lang="en-US"/>
           </a:p>
@@ -3372,7 +3373,7 @@
             </a:r>
             <a:r>
               <a:rPr lang="en-US" baseline="0" dirty="0"/>
-              <a:t> 002</a:t>
+              <a:t> 003</a:t>
             </a:r>
             <a:endParaRPr lang="en-US" dirty="0"/>
           </a:p>
@@ -8602,28 +8603,33 @@
           <a:p>
             <a:r>
               <a:rPr lang="en-US" dirty="0"/>
-              <a:t>Basic questions to ask:</a:t>
-            </a:r>
-          </a:p>
-          <a:p>
-            <a:pPr lvl="1"/>
-            <a:r>
-              <a:rPr lang="en-US" dirty="0"/>
-              <a:t>Which tasks belong to the most important 20% of my tasks?</a:t>
-            </a:r>
-          </a:p>
-          <a:p>
-            <a:pPr lvl="1"/>
-            <a:r>
-              <a:rPr lang="en-US" dirty="0"/>
-              <a:t>Who can do these tasks better/ faster than me?</a:t>
-            </a:r>
-          </a:p>
-          <a:p>
-            <a:pPr lvl="1"/>
-            <a:r>
-              <a:rPr lang="en-US" dirty="0"/>
-              <a:t>Which employees have the potential capacity to do them?</a:t>
+              <a:t>Define Point A (situation)</a:t>
+            </a:r>
+            <a:br>
+              <a:rPr lang="en-US" dirty="0"/>
+            </a:br>
+            <a:r>
+              <a:rPr lang="en-US" dirty="0"/>
+              <a:t>Problem statement, e.g. “no business”</a:t>
+            </a:r>
+          </a:p>
+          <a:p>
+            <a:r>
+              <a:rPr lang="en-US" dirty="0"/>
+              <a:t>Define Point B (alternative)</a:t>
+            </a:r>
+            <a:br>
+              <a:rPr lang="en-US" dirty="0"/>
+            </a:br>
+            <a:r>
+              <a:rPr lang="en-US" dirty="0"/>
+              <a:t>Specify the alternative, e.g. what it means to have business</a:t>
+            </a:r>
+          </a:p>
+          <a:p>
+            <a:r>
+              <a:rPr lang="en-US" dirty="0"/>
+              <a:t>Draw steps from Point A to Point B</a:t>
             </a:r>
           </a:p>
         </p:txBody>
@@ -8645,7 +8651,7 @@
           <a:p>
             <a:r>
               <a:rPr lang="en-US" dirty="0"/>
-              <a:t>Delegating</a:t>
+              <a:t>Problem Solving through Alternatives</a:t>
             </a:r>
           </a:p>
         </p:txBody>
@@ -8678,7 +8684,7 @@
     </p:spTree>
     <p:extLst>
       <p:ext uri="{BB962C8B-B14F-4D97-AF65-F5344CB8AC3E}">
-        <p14:creationId xmlns:p14="http://schemas.microsoft.com/office/powerpoint/2010/main" val="1272220114"/>
+        <p14:creationId xmlns:p14="http://schemas.microsoft.com/office/powerpoint/2010/main" val="3129071132"/>
       </p:ext>
     </p:extLst>
   </p:cSld>
@@ -8718,96 +8724,34 @@
         <p:spPr/>
         <p:txBody>
           <a:bodyPr>
-            <a:normAutofit fontScale="92500" lnSpcReduction="10000"/>
+            <a:normAutofit/>
           </a:bodyPr>
           <a:lstStyle/>
           <a:p>
             <a:r>
               <a:rPr lang="en-US" dirty="0"/>
-              <a:t>Task definition for delegation:</a:t>
+              <a:t>Basic questions to ask:</a:t>
             </a:r>
           </a:p>
           <a:p>
             <a:pPr lvl="1"/>
             <a:r>
               <a:rPr lang="en-US" dirty="0"/>
-              <a:t>What (objective, level of difficulty)</a:t>
+              <a:t>Which tasks belong to the most important 20% of my tasks?</a:t>
             </a:r>
           </a:p>
           <a:p>
             <a:pPr lvl="1"/>
             <a:r>
               <a:rPr lang="en-US" dirty="0"/>
-              <a:t>Who (competency, prerequisites)</a:t>
+              <a:t>Who can do these tasks better/ faster than me?</a:t>
             </a:r>
           </a:p>
           <a:p>
             <a:pPr lvl="1"/>
             <a:r>
               <a:rPr lang="en-US" dirty="0"/>
-              <a:t>What for (purpose, objective, who takes responsibility?)</a:t>
-            </a:r>
-          </a:p>
-          <a:p>
-            <a:pPr lvl="1"/>
-            <a:r>
-              <a:rPr lang="en-US" dirty="0"/>
-              <a:t>How (process, execution, feedback)</a:t>
-            </a:r>
-          </a:p>
-          <a:p>
-            <a:pPr lvl="1"/>
-            <a:r>
-              <a:rPr lang="en-US" dirty="0"/>
-              <a:t>With what (tools, resources)</a:t>
-            </a:r>
-          </a:p>
-          <a:p>
-            <a:pPr lvl="1"/>
-            <a:r>
-              <a:rPr lang="en-US" dirty="0"/>
-              <a:t>When (start, end, priority)</a:t>
-            </a:r>
-          </a:p>
-          <a:p>
-            <a:r>
-              <a:rPr lang="en-US" dirty="0"/>
-              <a:t>Guideline to delegate a task:</a:t>
-            </a:r>
-          </a:p>
-          <a:p>
-            <a:pPr lvl="1"/>
-            <a:r>
-              <a:rPr lang="en-US" dirty="0"/>
-              <a:t>Preparation (explain the objective, reason, qualifications of the employee)</a:t>
-            </a:r>
-          </a:p>
-          <a:p>
-            <a:pPr lvl="1"/>
-            <a:r>
-              <a:rPr lang="en-US" dirty="0"/>
-              <a:t>Orientation (reason to delegate, meeting objective)</a:t>
-            </a:r>
-          </a:p>
-          <a:p>
-            <a:pPr lvl="1"/>
-            <a:r>
-              <a:rPr lang="en-US" dirty="0"/>
-              <a:t>Clarification (explain task type, agree on task (what/who/..), measures, actions, control of success, documentation)</a:t>
-            </a:r>
-          </a:p>
-          <a:p>
-            <a:pPr lvl="1"/>
-            <a:r>
-              <a:rPr lang="en-US" dirty="0"/>
-              <a:t>Anchoring (who by when and what)</a:t>
-            </a:r>
-          </a:p>
-          <a:p>
-            <a:pPr lvl="1"/>
-            <a:r>
-              <a:rPr lang="en-US" dirty="0"/>
-              <a:t>Conclusion (summarize meeting results)</a:t>
+              <a:t>Which employees have the potential capacity to do them?</a:t>
             </a:r>
           </a:p>
         </p:txBody>
@@ -8862,7 +8806,7 @@
     </p:spTree>
     <p:extLst>
       <p:ext uri="{BB962C8B-B14F-4D97-AF65-F5344CB8AC3E}">
-        <p14:creationId xmlns:p14="http://schemas.microsoft.com/office/powerpoint/2010/main" val="2170637327"/>
+        <p14:creationId xmlns:p14="http://schemas.microsoft.com/office/powerpoint/2010/main" val="1272220114"/>
       </p:ext>
     </p:extLst>
   </p:cSld>
@@ -8902,19 +8846,96 @@
         <p:spPr/>
         <p:txBody>
           <a:bodyPr>
-            <a:normAutofit/>
+            <a:normAutofit fontScale="92500" lnSpcReduction="10000"/>
           </a:bodyPr>
           <a:lstStyle/>
           <a:p>
             <a:r>
               <a:rPr lang="en-US" dirty="0"/>
-              <a:t>Read about the effects of sleep/ food intake/ caffeine/ exercise. Understand your biological rhythm.</a:t>
-            </a:r>
-          </a:p>
-          <a:p>
-            <a:r>
-              <a:rPr lang="en-US" dirty="0"/>
-              <a:t>Schedule your intake and activities accordingly.</a:t>
+              <a:t>Task definition for delegation:</a:t>
+            </a:r>
+          </a:p>
+          <a:p>
+            <a:pPr lvl="1"/>
+            <a:r>
+              <a:rPr lang="en-US" dirty="0"/>
+              <a:t>What (objective, level of difficulty)</a:t>
+            </a:r>
+          </a:p>
+          <a:p>
+            <a:pPr lvl="1"/>
+            <a:r>
+              <a:rPr lang="en-US" dirty="0"/>
+              <a:t>Who (competency, prerequisites)</a:t>
+            </a:r>
+          </a:p>
+          <a:p>
+            <a:pPr lvl="1"/>
+            <a:r>
+              <a:rPr lang="en-US" dirty="0"/>
+              <a:t>What for (purpose, objective, who takes responsibility?)</a:t>
+            </a:r>
+          </a:p>
+          <a:p>
+            <a:pPr lvl="1"/>
+            <a:r>
+              <a:rPr lang="en-US" dirty="0"/>
+              <a:t>How (process, execution, feedback)</a:t>
+            </a:r>
+          </a:p>
+          <a:p>
+            <a:pPr lvl="1"/>
+            <a:r>
+              <a:rPr lang="en-US" dirty="0"/>
+              <a:t>With what (tools, resources)</a:t>
+            </a:r>
+          </a:p>
+          <a:p>
+            <a:pPr lvl="1"/>
+            <a:r>
+              <a:rPr lang="en-US" dirty="0"/>
+              <a:t>When (start, end, priority)</a:t>
+            </a:r>
+          </a:p>
+          <a:p>
+            <a:r>
+              <a:rPr lang="en-US" dirty="0"/>
+              <a:t>Guideline to delegate a task:</a:t>
+            </a:r>
+          </a:p>
+          <a:p>
+            <a:pPr lvl="1"/>
+            <a:r>
+              <a:rPr lang="en-US" dirty="0"/>
+              <a:t>Preparation (explain the objective, reason, qualifications of the employee)</a:t>
+            </a:r>
+          </a:p>
+          <a:p>
+            <a:pPr lvl="1"/>
+            <a:r>
+              <a:rPr lang="en-US" dirty="0"/>
+              <a:t>Orientation (reason to delegate, meeting objective)</a:t>
+            </a:r>
+          </a:p>
+          <a:p>
+            <a:pPr lvl="1"/>
+            <a:r>
+              <a:rPr lang="en-US" dirty="0"/>
+              <a:t>Clarification (explain task type, agree on task (what/who/..), measures, actions, control of success, documentation)</a:t>
+            </a:r>
+          </a:p>
+          <a:p>
+            <a:pPr lvl="1"/>
+            <a:r>
+              <a:rPr lang="en-US" dirty="0"/>
+              <a:t>Anchoring (who by when and what)</a:t>
+            </a:r>
+          </a:p>
+          <a:p>
+            <a:pPr lvl="1"/>
+            <a:r>
+              <a:rPr lang="en-US" dirty="0"/>
+              <a:t>Conclusion (summarize meeting results)</a:t>
             </a:r>
           </a:p>
         </p:txBody>
@@ -8936,7 +8957,7 @@
           <a:p>
             <a:r>
               <a:rPr lang="en-US" dirty="0"/>
-              <a:t>Chemicals</a:t>
+              <a:t>Delegating</a:t>
             </a:r>
           </a:p>
         </p:txBody>
@@ -8969,7 +8990,7 @@
     </p:spTree>
     <p:extLst>
       <p:ext uri="{BB962C8B-B14F-4D97-AF65-F5344CB8AC3E}">
-        <p14:creationId xmlns:p14="http://schemas.microsoft.com/office/powerpoint/2010/main" val="4021125665"/>
+        <p14:creationId xmlns:p14="http://schemas.microsoft.com/office/powerpoint/2010/main" val="2170637327"/>
       </p:ext>
     </p:extLst>
   </p:cSld>
@@ -9015,48 +9036,13 @@
           <a:p>
             <a:r>
               <a:rPr lang="en-US" dirty="0"/>
-              <a:t>Baseline culture:</a:t>
-            </a:r>
-          </a:p>
-          <a:p>
-            <a:pPr lvl="1"/>
-            <a:r>
-              <a:rPr lang="en-US" dirty="0"/>
-              <a:t>Criticize negatives, ignore positives</a:t>
-            </a:r>
-          </a:p>
-          <a:p>
-            <a:r>
-              <a:rPr lang="en-US" dirty="0"/>
-              <a:t>Alternative culture: </a:t>
-            </a:r>
-          </a:p>
-          <a:p>
-            <a:pPr lvl="1"/>
-            <a:r>
-              <a:rPr lang="en-US" dirty="0"/>
-              <a:t>Highlight, work and penetrate on pain points</a:t>
-            </a:r>
-            <a:br>
-              <a:rPr lang="en-US" dirty="0"/>
-            </a:br>
-            <a:r>
-              <a:rPr lang="en-US" dirty="0"/>
-              <a:t>(of oneself and others)</a:t>
-            </a:r>
-          </a:p>
-          <a:p>
-            <a:pPr lvl="1"/>
-            <a:r>
-              <a:rPr lang="en-US" dirty="0"/>
-              <a:t>Give positive feedback, highlight and celebrate positives</a:t>
-            </a:r>
-          </a:p>
-          <a:p>
-            <a:pPr lvl="1"/>
-            <a:r>
-              <a:rPr lang="en-US" dirty="0"/>
-              <a:t>Effectively move discourse to the relevant points</a:t>
+              <a:t>Read about the effects of sleep/ food intake/ caffeine/ exercise. Understand your biological rhythm.</a:t>
+            </a:r>
+          </a:p>
+          <a:p>
+            <a:r>
+              <a:rPr lang="en-US" dirty="0"/>
+              <a:t>Schedule your intake and activities accordingly.</a:t>
             </a:r>
           </a:p>
         </p:txBody>
@@ -9078,7 +9064,7 @@
           <a:p>
             <a:r>
               <a:rPr lang="en-US" dirty="0"/>
-              <a:t>Culture</a:t>
+              <a:t>Chemicals</a:t>
             </a:r>
           </a:p>
         </p:txBody>
@@ -9103,6 +9089,148 @@
               <a:rPr lang="en-US" smtClean="0"/>
               <a:pPr algn="l"/>
               <a:t>24</a:t>
+            </a:fld>
+            <a:endParaRPr lang="en-US" dirty="0"/>
+          </a:p>
+        </p:txBody>
+      </p:sp>
+    </p:spTree>
+    <p:extLst>
+      <p:ext uri="{BB962C8B-B14F-4D97-AF65-F5344CB8AC3E}">
+        <p14:creationId xmlns:p14="http://schemas.microsoft.com/office/powerpoint/2010/main" val="4021125665"/>
+      </p:ext>
+    </p:extLst>
+  </p:cSld>
+  <p:clrMapOvr>
+    <a:masterClrMapping/>
+  </p:clrMapOvr>
+</p:sld>
+</file>
+
+<file path=ppt/slides/slide25.xml><?xml version="1.0" encoding="utf-8"?>
+<p:sld xmlns:a="http://schemas.openxmlformats.org/drawingml/2006/main" xmlns:r="http://schemas.openxmlformats.org/officeDocument/2006/relationships" xmlns:p="http://schemas.openxmlformats.org/presentationml/2006/main">
+  <p:cSld>
+    <p:spTree>
+      <p:nvGrpSpPr>
+        <p:cNvPr id="1" name=""/>
+        <p:cNvGrpSpPr/>
+        <p:nvPr/>
+      </p:nvGrpSpPr>
+      <p:grpSpPr>
+        <a:xfrm>
+          <a:off x="0" y="0"/>
+          <a:ext cx="0" cy="0"/>
+          <a:chOff x="0" y="0"/>
+          <a:chExt cx="0" cy="0"/>
+        </a:xfrm>
+      </p:grpSpPr>
+      <p:sp>
+        <p:nvSpPr>
+          <p:cNvPr id="3" name="Content Placeholder 2"/>
+          <p:cNvSpPr>
+            <a:spLocks noGrp="1"/>
+          </p:cNvSpPr>
+          <p:nvPr>
+            <p:ph idx="1"/>
+          </p:nvPr>
+        </p:nvSpPr>
+        <p:spPr/>
+        <p:txBody>
+          <a:bodyPr>
+            <a:normAutofit/>
+          </a:bodyPr>
+          <a:lstStyle/>
+          <a:p>
+            <a:r>
+              <a:rPr lang="en-US" dirty="0"/>
+              <a:t>Baseline culture:</a:t>
+            </a:r>
+          </a:p>
+          <a:p>
+            <a:pPr lvl="1"/>
+            <a:r>
+              <a:rPr lang="en-US" dirty="0"/>
+              <a:t>Criticize negatives, ignore positives</a:t>
+            </a:r>
+          </a:p>
+          <a:p>
+            <a:r>
+              <a:rPr lang="en-US" dirty="0"/>
+              <a:t>Alternative culture: </a:t>
+            </a:r>
+          </a:p>
+          <a:p>
+            <a:pPr lvl="1"/>
+            <a:r>
+              <a:rPr lang="en-US" dirty="0"/>
+              <a:t>Highlight, work and penetrate on pain points</a:t>
+            </a:r>
+            <a:br>
+              <a:rPr lang="en-US" dirty="0"/>
+            </a:br>
+            <a:r>
+              <a:rPr lang="en-US" dirty="0"/>
+              <a:t>(of oneself and others)</a:t>
+            </a:r>
+          </a:p>
+          <a:p>
+            <a:pPr lvl="1"/>
+            <a:r>
+              <a:rPr lang="en-US" dirty="0"/>
+              <a:t>Give positive feedback, highlight and celebrate positives</a:t>
+            </a:r>
+          </a:p>
+          <a:p>
+            <a:pPr lvl="1"/>
+            <a:r>
+              <a:rPr lang="en-US" dirty="0"/>
+              <a:t>Effectively move discourse to the relevant points</a:t>
+            </a:r>
+          </a:p>
+        </p:txBody>
+      </p:sp>
+      <p:sp>
+        <p:nvSpPr>
+          <p:cNvPr id="2" name="Title 1"/>
+          <p:cNvSpPr>
+            <a:spLocks noGrp="1"/>
+          </p:cNvSpPr>
+          <p:nvPr>
+            <p:ph type="title"/>
+          </p:nvPr>
+        </p:nvSpPr>
+        <p:spPr/>
+        <p:txBody>
+          <a:bodyPr/>
+          <a:lstStyle/>
+          <a:p>
+            <a:r>
+              <a:rPr lang="en-US" dirty="0"/>
+              <a:t>Culture</a:t>
+            </a:r>
+          </a:p>
+        </p:txBody>
+      </p:sp>
+      <p:sp>
+        <p:nvSpPr>
+          <p:cNvPr id="4" name="Slide Number Placeholder 3"/>
+          <p:cNvSpPr>
+            <a:spLocks noGrp="1"/>
+          </p:cNvSpPr>
+          <p:nvPr>
+            <p:ph type="sldNum" sz="quarter" idx="12"/>
+          </p:nvPr>
+        </p:nvSpPr>
+        <p:spPr/>
+        <p:txBody>
+          <a:bodyPr/>
+          <a:lstStyle/>
+          <a:p>
+            <a:pPr algn="l"/>
+            <a:fld id="{11CDFDCC-1F45-4E80-8B17-15DA0BDDC059}" type="slidenum">
+              <a:rPr lang="en-US" smtClean="0"/>
+              <a:pPr algn="l"/>
+              <a:t>25</a:t>
             </a:fld>
             <a:endParaRPr lang="en-US" dirty="0"/>
           </a:p>

</xml_diff>

<commit_message>
Update materials for leadership training
</commit_message>
<xml_diff>
--- a/2. Design and Development/DOC-202 - Training Leadership.pptx
+++ b/2. Design and Development/DOC-202 - Training Leadership.pptx
@@ -5,34 +5,37 @@
     <p:sldMasterId id="2147483648" r:id="rId1"/>
   </p:sldMasterIdLst>
   <p:notesMasterIdLst>
-    <p:notesMasterId r:id="rId27"/>
+    <p:notesMasterId r:id="rId30"/>
   </p:notesMasterIdLst>
   <p:sldIdLst>
     <p:sldId id="256" r:id="rId2"/>
     <p:sldId id="277" r:id="rId3"/>
-    <p:sldId id="262" r:id="rId4"/>
-    <p:sldId id="289" r:id="rId5"/>
-    <p:sldId id="290" r:id="rId6"/>
-    <p:sldId id="291" r:id="rId7"/>
-    <p:sldId id="271" r:id="rId8"/>
-    <p:sldId id="272" r:id="rId9"/>
-    <p:sldId id="275" r:id="rId10"/>
-    <p:sldId id="285" r:id="rId11"/>
-    <p:sldId id="265" r:id="rId12"/>
-    <p:sldId id="267" r:id="rId13"/>
-    <p:sldId id="269" r:id="rId14"/>
-    <p:sldId id="280" r:id="rId15"/>
-    <p:sldId id="270" r:id="rId16"/>
-    <p:sldId id="278" r:id="rId17"/>
-    <p:sldId id="279" r:id="rId18"/>
-    <p:sldId id="281" r:id="rId19"/>
-    <p:sldId id="288" r:id="rId20"/>
-    <p:sldId id="283" r:id="rId21"/>
-    <p:sldId id="292" r:id="rId22"/>
-    <p:sldId id="286" r:id="rId23"/>
-    <p:sldId id="287" r:id="rId24"/>
-    <p:sldId id="282" r:id="rId25"/>
-    <p:sldId id="284" r:id="rId26"/>
+    <p:sldId id="295" r:id="rId4"/>
+    <p:sldId id="262" r:id="rId5"/>
+    <p:sldId id="289" r:id="rId6"/>
+    <p:sldId id="290" r:id="rId7"/>
+    <p:sldId id="291" r:id="rId8"/>
+    <p:sldId id="271" r:id="rId9"/>
+    <p:sldId id="272" r:id="rId10"/>
+    <p:sldId id="275" r:id="rId11"/>
+    <p:sldId id="285" r:id="rId12"/>
+    <p:sldId id="265" r:id="rId13"/>
+    <p:sldId id="267" r:id="rId14"/>
+    <p:sldId id="269" r:id="rId15"/>
+    <p:sldId id="280" r:id="rId16"/>
+    <p:sldId id="270" r:id="rId17"/>
+    <p:sldId id="278" r:id="rId18"/>
+    <p:sldId id="279" r:id="rId19"/>
+    <p:sldId id="281" r:id="rId20"/>
+    <p:sldId id="288" r:id="rId21"/>
+    <p:sldId id="283" r:id="rId22"/>
+    <p:sldId id="292" r:id="rId23"/>
+    <p:sldId id="286" r:id="rId24"/>
+    <p:sldId id="287" r:id="rId25"/>
+    <p:sldId id="282" r:id="rId26"/>
+    <p:sldId id="293" r:id="rId27"/>
+    <p:sldId id="294" r:id="rId28"/>
+    <p:sldId id="284" r:id="rId29"/>
   </p:sldIdLst>
   <p:sldSz cx="12192000" cy="6858000"/>
   <p:notesSz cx="6858000" cy="9144000"/>
@@ -221,7 +224,7 @@
           <a:p>
             <a:fld id="{5464E162-CBEC-4925-93AE-447FF31D8791}" type="datetimeFigureOut">
               <a:rPr lang="en-US" smtClean="0"/>
-              <a:t>6/20/24</a:t>
+              <a:t>6/19/25</a:t>
             </a:fld>
             <a:endParaRPr lang="en-US"/>
           </a:p>
@@ -3373,7 +3376,7 @@
             </a:r>
             <a:r>
               <a:rPr lang="en-US" baseline="0" dirty="0"/>
-              <a:t> 003</a:t>
+              <a:t> 004</a:t>
             </a:r>
             <a:endParaRPr lang="en-US" dirty="0"/>
           </a:p>
@@ -3998,7 +4001,7 @@
           <a:p>
             <a:r>
               <a:rPr lang="en-US" dirty="0"/>
-              <a:t>Roles and Communication</a:t>
+              <a:t>Leadership DNA</a:t>
             </a:r>
           </a:p>
         </p:txBody>
@@ -4022,65 +4025,52 @@
         <p:spPr/>
         <p:txBody>
           <a:bodyPr>
-            <a:normAutofit fontScale="92500"/>
+            <a:normAutofit fontScale="92500" lnSpcReduction="10000"/>
           </a:bodyPr>
           <a:lstStyle/>
           <a:p>
             <a:r>
               <a:rPr lang="en-US" dirty="0"/>
-              <a:t>Some say, communication is</a:t>
-            </a:r>
-          </a:p>
-          <a:p>
-            <a:pPr lvl="1"/>
-            <a:r>
-              <a:rPr lang="en-US" dirty="0"/>
-              <a:t>7% content</a:t>
-            </a:r>
-          </a:p>
-          <a:p>
-            <a:pPr lvl="1"/>
-            <a:r>
-              <a:rPr lang="en-US" dirty="0"/>
-              <a:t>35% voice</a:t>
-            </a:r>
-          </a:p>
-          <a:p>
-            <a:pPr lvl="1"/>
-            <a:r>
-              <a:rPr lang="en-US" dirty="0"/>
-              <a:t>58% body language</a:t>
-            </a:r>
-          </a:p>
-          <a:p>
-            <a:r>
-              <a:rPr lang="en-US" dirty="0"/>
-              <a:t>However, people notice when you superimpose language/ external appearance over your own personality or role</a:t>
-            </a:r>
-          </a:p>
-          <a:p>
-            <a:r>
-              <a:rPr lang="en-US" dirty="0"/>
-              <a:t>Instead, use playgrounds to create and practice spaces of language</a:t>
-            </a:r>
-          </a:p>
-          <a:p>
-            <a:r>
-              <a:rPr lang="en-US" dirty="0"/>
-              <a:t>Always use language from inside out, so it is in line with your personality/role.</a:t>
-            </a:r>
-          </a:p>
-          <a:p>
-            <a:r>
-              <a:rPr lang="en-US" dirty="0"/>
-              <a:t>Basic attitude for a communication, by Carl Rogers:</a:t>
+              <a:t>Personal values (e.g. hope, excellence, commitment)</a:t>
             </a:r>
             <a:br>
               <a:rPr lang="en-US" dirty="0"/>
             </a:br>
             <a:r>
               <a:rPr lang="en-US" dirty="0"/>
-              <a:t>be real (I-message), be empathic (active listening), show acceptance (avoid blockers, open doors for active listening of others)</a:t>
+              <a:t>Method to identify them: who are the role models that have influenced you throughout your life? What are the values associated with them? Which ones of these values have to you transferred into your life?</a:t>
+            </a:r>
+          </a:p>
+          <a:p>
+            <a:r>
+              <a:rPr lang="en-US" dirty="0"/>
+              <a:t>Strengths/Weaknesses</a:t>
+            </a:r>
+            <a:br>
+              <a:rPr lang="en-US" dirty="0"/>
+            </a:br>
+            <a:r>
+              <a:rPr lang="en-US" dirty="0"/>
+              <a:t>Method to identify them: strengths seen by you, colleagues, friends/family, when do I inspire others?</a:t>
+            </a:r>
+          </a:p>
+          <a:p>
+            <a:r>
+              <a:rPr lang="en-US" dirty="0"/>
+              <a:t>Roles</a:t>
+            </a:r>
+            <a:br>
+              <a:rPr lang="en-US" dirty="0"/>
+            </a:br>
+            <a:r>
+              <a:rPr lang="en-US" dirty="0"/>
+              <a:t>Coach, delegator, trainer, decision-maker, role model, mentor, visionary, problem solver, “Macher”, cheerleader, listener, communicator, manager, innovator, networker, supervisor, conflict manager, organizer, strategist, motivator, adaptor, influencer, goal setter, executive</a:t>
+            </a:r>
+          </a:p>
+          <a:p>
+            <a:r>
+              <a:rPr lang="en-US" dirty="0"/>
+              <a:t>Vision/ big picture</a:t>
             </a:r>
           </a:p>
         </p:txBody>
@@ -4119,7 +4109,7 @@
     </p:spTree>
     <p:extLst>
       <p:ext uri="{BB962C8B-B14F-4D97-AF65-F5344CB8AC3E}">
-        <p14:creationId xmlns:p14="http://schemas.microsoft.com/office/powerpoint/2010/main" val="4003558119"/>
+        <p14:creationId xmlns:p14="http://schemas.microsoft.com/office/powerpoint/2010/main" val="2487218682"/>
       </p:ext>
     </p:extLst>
   </p:cSld>
@@ -4148,7 +4138,13 @@
       </p:grpSpPr>
       <p:sp>
         <p:nvSpPr>
-          <p:cNvPr id="2" name="Title 1"/>
+          <p:cNvPr id="2" name="Title 1">
+            <a:extLst>
+              <a:ext uri="{FF2B5EF4-FFF2-40B4-BE49-F238E27FC236}">
+                <a16:creationId xmlns:a16="http://schemas.microsoft.com/office/drawing/2014/main" id="{41EDFC7B-CEC6-4D4F-CA77-71A6AC01BD4D}"/>
+              </a:ext>
+            </a:extLst>
+          </p:cNvPr>
           <p:cNvSpPr>
             <a:spLocks noGrp="1"/>
           </p:cNvSpPr>
@@ -4163,14 +4159,102 @@
           <a:p>
             <a:r>
               <a:rPr lang="en-US" dirty="0"/>
-              <a:t>Disciplinary vs. Networking Aspects</a:t>
-            </a:r>
-          </a:p>
-        </p:txBody>
-      </p:sp>
-      <p:sp>
-        <p:nvSpPr>
-          <p:cNvPr id="4" name="Slide Number Placeholder 3"/>
+              <a:t>Roles and Communication</a:t>
+            </a:r>
+          </a:p>
+        </p:txBody>
+      </p:sp>
+      <p:sp>
+        <p:nvSpPr>
+          <p:cNvPr id="3" name="Content Placeholder 2">
+            <a:extLst>
+              <a:ext uri="{FF2B5EF4-FFF2-40B4-BE49-F238E27FC236}">
+                <a16:creationId xmlns:a16="http://schemas.microsoft.com/office/drawing/2014/main" id="{45F12395-FAB7-454D-418A-7B74D59C371D}"/>
+              </a:ext>
+            </a:extLst>
+          </p:cNvPr>
+          <p:cNvSpPr>
+            <a:spLocks noGrp="1"/>
+          </p:cNvSpPr>
+          <p:nvPr>
+            <p:ph idx="1"/>
+          </p:nvPr>
+        </p:nvSpPr>
+        <p:spPr/>
+        <p:txBody>
+          <a:bodyPr>
+            <a:normAutofit fontScale="92500"/>
+          </a:bodyPr>
+          <a:lstStyle/>
+          <a:p>
+            <a:r>
+              <a:rPr lang="en-US" dirty="0"/>
+              <a:t>Some say, communication is</a:t>
+            </a:r>
+          </a:p>
+          <a:p>
+            <a:pPr lvl="1"/>
+            <a:r>
+              <a:rPr lang="en-US" dirty="0"/>
+              <a:t>7% content</a:t>
+            </a:r>
+          </a:p>
+          <a:p>
+            <a:pPr lvl="1"/>
+            <a:r>
+              <a:rPr lang="en-US" dirty="0"/>
+              <a:t>35% voice</a:t>
+            </a:r>
+          </a:p>
+          <a:p>
+            <a:pPr lvl="1"/>
+            <a:r>
+              <a:rPr lang="en-US" dirty="0"/>
+              <a:t>58% body language</a:t>
+            </a:r>
+          </a:p>
+          <a:p>
+            <a:r>
+              <a:rPr lang="en-US" dirty="0"/>
+              <a:t>However, people notice when you superimpose language/ external appearance over your own personality or role</a:t>
+            </a:r>
+          </a:p>
+          <a:p>
+            <a:r>
+              <a:rPr lang="en-US" dirty="0"/>
+              <a:t>Instead, use playgrounds to create and practice spaces of language</a:t>
+            </a:r>
+          </a:p>
+          <a:p>
+            <a:r>
+              <a:rPr lang="en-US" dirty="0"/>
+              <a:t>Always use language from inside out, so it is in line with your personality/role.</a:t>
+            </a:r>
+          </a:p>
+          <a:p>
+            <a:r>
+              <a:rPr lang="en-US" dirty="0"/>
+              <a:t>Basic attitude for a communication, by Carl Rogers:</a:t>
+            </a:r>
+            <a:br>
+              <a:rPr lang="en-US" dirty="0"/>
+            </a:br>
+            <a:r>
+              <a:rPr lang="en-US" dirty="0"/>
+              <a:t>be real (I-message), be empathic (active listening), show acceptance (avoid blockers, open doors for active listening of others)</a:t>
+            </a:r>
+          </a:p>
+        </p:txBody>
+      </p:sp>
+      <p:sp>
+        <p:nvSpPr>
+          <p:cNvPr id="4" name="Slide Number Placeholder 3">
+            <a:extLst>
+              <a:ext uri="{FF2B5EF4-FFF2-40B4-BE49-F238E27FC236}">
+                <a16:creationId xmlns:a16="http://schemas.microsoft.com/office/drawing/2014/main" id="{DAFAA701-9760-DA1A-F46A-8E1512BD3F74}"/>
+              </a:ext>
+            </a:extLst>
+          </p:cNvPr>
           <p:cNvSpPr>
             <a:spLocks noGrp="1"/>
           </p:cNvSpPr>
@@ -4188,6 +4272,83 @@
               <a:rPr lang="en-US" smtClean="0"/>
               <a:pPr algn="l"/>
               <a:t>11</a:t>
+            </a:fld>
+            <a:endParaRPr lang="en-US" dirty="0"/>
+          </a:p>
+        </p:txBody>
+      </p:sp>
+    </p:spTree>
+    <p:extLst>
+      <p:ext uri="{BB962C8B-B14F-4D97-AF65-F5344CB8AC3E}">
+        <p14:creationId xmlns:p14="http://schemas.microsoft.com/office/powerpoint/2010/main" val="4003558119"/>
+      </p:ext>
+    </p:extLst>
+  </p:cSld>
+  <p:clrMapOvr>
+    <a:masterClrMapping/>
+  </p:clrMapOvr>
+</p:sld>
+</file>
+
+<file path=ppt/slides/slide12.xml><?xml version="1.0" encoding="utf-8"?>
+<p:sld xmlns:a="http://schemas.openxmlformats.org/drawingml/2006/main" xmlns:r="http://schemas.openxmlformats.org/officeDocument/2006/relationships" xmlns:p="http://schemas.openxmlformats.org/presentationml/2006/main">
+  <p:cSld>
+    <p:spTree>
+      <p:nvGrpSpPr>
+        <p:cNvPr id="1" name=""/>
+        <p:cNvGrpSpPr/>
+        <p:nvPr/>
+      </p:nvGrpSpPr>
+      <p:grpSpPr>
+        <a:xfrm>
+          <a:off x="0" y="0"/>
+          <a:ext cx="0" cy="0"/>
+          <a:chOff x="0" y="0"/>
+          <a:chExt cx="0" cy="0"/>
+        </a:xfrm>
+      </p:grpSpPr>
+      <p:sp>
+        <p:nvSpPr>
+          <p:cNvPr id="2" name="Title 1"/>
+          <p:cNvSpPr>
+            <a:spLocks noGrp="1"/>
+          </p:cNvSpPr>
+          <p:nvPr>
+            <p:ph type="title"/>
+          </p:nvPr>
+        </p:nvSpPr>
+        <p:spPr/>
+        <p:txBody>
+          <a:bodyPr/>
+          <a:lstStyle/>
+          <a:p>
+            <a:r>
+              <a:rPr lang="en-US" dirty="0"/>
+              <a:t>Disciplinary vs. Networking Aspects</a:t>
+            </a:r>
+          </a:p>
+        </p:txBody>
+      </p:sp>
+      <p:sp>
+        <p:nvSpPr>
+          <p:cNvPr id="4" name="Slide Number Placeholder 3"/>
+          <p:cNvSpPr>
+            <a:spLocks noGrp="1"/>
+          </p:cNvSpPr>
+          <p:nvPr>
+            <p:ph type="sldNum" sz="quarter" idx="12"/>
+          </p:nvPr>
+        </p:nvSpPr>
+        <p:spPr/>
+        <p:txBody>
+          <a:bodyPr/>
+          <a:lstStyle/>
+          <a:p>
+            <a:pPr algn="l"/>
+            <a:fld id="{11CDFDCC-1F45-4E80-8B17-15DA0BDDC059}" type="slidenum">
+              <a:rPr lang="en-US" smtClean="0"/>
+              <a:pPr algn="l"/>
+              <a:t>12</a:t>
             </a:fld>
             <a:endParaRPr lang="en-US" dirty="0"/>
           </a:p>
@@ -4932,7 +5093,7 @@
 </p:sld>
 </file>
 
-<file path=ppt/slides/slide12.xml><?xml version="1.0" encoding="utf-8"?>
+<file path=ppt/slides/slide13.xml><?xml version="1.0" encoding="utf-8"?>
 <p:sld xmlns:a="http://schemas.openxmlformats.org/drawingml/2006/main" xmlns:r="http://schemas.openxmlformats.org/officeDocument/2006/relationships" xmlns:p="http://schemas.openxmlformats.org/presentationml/2006/main">
   <p:cSld>
     <p:spTree>
@@ -4990,7 +5151,7 @@
             <a:fld id="{11CDFDCC-1F45-4E80-8B17-15DA0BDDC059}" type="slidenum">
               <a:rPr lang="en-US" smtClean="0"/>
               <a:pPr algn="l"/>
-              <a:t>12</a:t>
+              <a:t>13</a:t>
             </a:fld>
             <a:endParaRPr lang="en-US" dirty="0"/>
           </a:p>
@@ -5905,145 +6066,6 @@
 </p:sld>
 </file>
 
-<file path=ppt/slides/slide13.xml><?xml version="1.0" encoding="utf-8"?>
-<p:sld xmlns:a="http://schemas.openxmlformats.org/drawingml/2006/main" xmlns:r="http://schemas.openxmlformats.org/officeDocument/2006/relationships" xmlns:p="http://schemas.openxmlformats.org/presentationml/2006/main">
-  <p:cSld>
-    <p:spTree>
-      <p:nvGrpSpPr>
-        <p:cNvPr id="1" name=""/>
-        <p:cNvGrpSpPr/>
-        <p:nvPr/>
-      </p:nvGrpSpPr>
-      <p:grpSpPr>
-        <a:xfrm>
-          <a:off x="0" y="0"/>
-          <a:ext cx="0" cy="0"/>
-          <a:chOff x="0" y="0"/>
-          <a:chExt cx="0" cy="0"/>
-        </a:xfrm>
-      </p:grpSpPr>
-      <p:sp>
-        <p:nvSpPr>
-          <p:cNvPr id="2" name="Title 1">
-            <a:extLst>
-              <a:ext uri="{FF2B5EF4-FFF2-40B4-BE49-F238E27FC236}">
-                <a16:creationId xmlns:a16="http://schemas.microsoft.com/office/drawing/2014/main" id="{E6A5A86B-5747-34FF-24D0-C181298EA89D}"/>
-              </a:ext>
-            </a:extLst>
-          </p:cNvPr>
-          <p:cNvSpPr>
-            <a:spLocks noGrp="1"/>
-          </p:cNvSpPr>
-          <p:nvPr>
-            <p:ph type="title"/>
-          </p:nvPr>
-        </p:nvSpPr>
-        <p:spPr/>
-        <p:txBody>
-          <a:bodyPr/>
-          <a:lstStyle/>
-          <a:p>
-            <a:r>
-              <a:rPr lang="en-US" dirty="0"/>
-              <a:t>Tricks and Tools</a:t>
-            </a:r>
-          </a:p>
-        </p:txBody>
-      </p:sp>
-      <p:sp>
-        <p:nvSpPr>
-          <p:cNvPr id="3" name="Content Placeholder 2">
-            <a:extLst>
-              <a:ext uri="{FF2B5EF4-FFF2-40B4-BE49-F238E27FC236}">
-                <a16:creationId xmlns:a16="http://schemas.microsoft.com/office/drawing/2014/main" id="{FA9BBDEC-6991-56BD-FE0B-55E8B393BD8C}"/>
-              </a:ext>
-            </a:extLst>
-          </p:cNvPr>
-          <p:cNvSpPr>
-            <a:spLocks noGrp="1"/>
-          </p:cNvSpPr>
-          <p:nvPr>
-            <p:ph idx="1"/>
-          </p:nvPr>
-        </p:nvSpPr>
-        <p:spPr/>
-        <p:txBody>
-          <a:bodyPr>
-            <a:normAutofit/>
-          </a:bodyPr>
-          <a:lstStyle/>
-          <a:p>
-            <a:r>
-              <a:rPr lang="en-US" dirty="0"/>
-              <a:t>“If you want to travel fast, travel alone. If you want to embark on a long journey, travel together.”</a:t>
-            </a:r>
-          </a:p>
-          <a:p>
-            <a:r>
-              <a:rPr lang="en-US" dirty="0"/>
-              <a:t>Expectation Management</a:t>
-            </a:r>
-          </a:p>
-          <a:p>
-            <a:pPr lvl="1"/>
-            <a:r>
-              <a:rPr lang="en-US" dirty="0"/>
-              <a:t>Communicate expectations early-on, so you can relate to them in case of conflict.</a:t>
-            </a:r>
-          </a:p>
-          <a:p>
-            <a:pPr lvl="1"/>
-            <a:r>
-              <a:rPr lang="en-US" dirty="0"/>
-              <a:t>As an alternative strategy to explicit communication: validate expectations early-on with micro milestones (keep it simple, e.g., run a sprint with small yet challenging tasks)</a:t>
-            </a:r>
-          </a:p>
-        </p:txBody>
-      </p:sp>
-      <p:sp>
-        <p:nvSpPr>
-          <p:cNvPr id="4" name="Slide Number Placeholder 3">
-            <a:extLst>
-              <a:ext uri="{FF2B5EF4-FFF2-40B4-BE49-F238E27FC236}">
-                <a16:creationId xmlns:a16="http://schemas.microsoft.com/office/drawing/2014/main" id="{E5188A07-3DEA-0DCD-951F-43AA59D65642}"/>
-              </a:ext>
-            </a:extLst>
-          </p:cNvPr>
-          <p:cNvSpPr>
-            <a:spLocks noGrp="1"/>
-          </p:cNvSpPr>
-          <p:nvPr>
-            <p:ph type="sldNum" sz="quarter" idx="12"/>
-          </p:nvPr>
-        </p:nvSpPr>
-        <p:spPr/>
-        <p:txBody>
-          <a:bodyPr/>
-          <a:lstStyle/>
-          <a:p>
-            <a:pPr algn="l"/>
-            <a:fld id="{11CDFDCC-1F45-4E80-8B17-15DA0BDDC059}" type="slidenum">
-              <a:rPr lang="en-US" smtClean="0"/>
-              <a:pPr algn="l"/>
-              <a:t>13</a:t>
-            </a:fld>
-            <a:endParaRPr lang="en-US" dirty="0"/>
-          </a:p>
-        </p:txBody>
-      </p:sp>
-    </p:spTree>
-    <p:extLst>
-      <p:ext uri="{BB962C8B-B14F-4D97-AF65-F5344CB8AC3E}">
-        <p14:creationId xmlns:p14="http://schemas.microsoft.com/office/powerpoint/2010/main" val="2745352305"/>
-      </p:ext>
-    </p:extLst>
-  </p:cSld>
-  <p:clrMapOvr>
-    <a:masterClrMapping/>
-  </p:clrMapOvr>
-</p:sld>
-</file>
-
 <file path=ppt/slides/slide14.xml><?xml version="1.0" encoding="utf-8"?>
 <p:sld xmlns:a="http://schemas.openxmlformats.org/drawingml/2006/main" xmlns:r="http://schemas.openxmlformats.org/officeDocument/2006/relationships" xmlns:p="http://schemas.openxmlformats.org/presentationml/2006/main">
   <p:cSld>
@@ -6063,7 +6085,13 @@
       </p:grpSpPr>
       <p:sp>
         <p:nvSpPr>
-          <p:cNvPr id="2" name="Title 1"/>
+          <p:cNvPr id="2" name="Title 1">
+            <a:extLst>
+              <a:ext uri="{FF2B5EF4-FFF2-40B4-BE49-F238E27FC236}">
+                <a16:creationId xmlns:a16="http://schemas.microsoft.com/office/drawing/2014/main" id="{E6A5A86B-5747-34FF-24D0-C181298EA89D}"/>
+              </a:ext>
+            </a:extLst>
+          </p:cNvPr>
           <p:cNvSpPr>
             <a:spLocks noGrp="1"/>
           </p:cNvSpPr>
@@ -6078,14 +6106,56 @@
           <a:p>
             <a:r>
               <a:rPr lang="en-US" dirty="0"/>
-              <a:t>Stakeholder Management</a:t>
-            </a:r>
-          </a:p>
-        </p:txBody>
-      </p:sp>
-      <p:sp>
-        <p:nvSpPr>
-          <p:cNvPr id="4" name="Slide Number Placeholder 3"/>
+              <a:t>Expectation Management</a:t>
+            </a:r>
+          </a:p>
+        </p:txBody>
+      </p:sp>
+      <p:sp>
+        <p:nvSpPr>
+          <p:cNvPr id="3" name="Content Placeholder 2">
+            <a:extLst>
+              <a:ext uri="{FF2B5EF4-FFF2-40B4-BE49-F238E27FC236}">
+                <a16:creationId xmlns:a16="http://schemas.microsoft.com/office/drawing/2014/main" id="{FA9BBDEC-6991-56BD-FE0B-55E8B393BD8C}"/>
+              </a:ext>
+            </a:extLst>
+          </p:cNvPr>
+          <p:cNvSpPr>
+            <a:spLocks noGrp="1"/>
+          </p:cNvSpPr>
+          <p:nvPr>
+            <p:ph idx="1"/>
+          </p:nvPr>
+        </p:nvSpPr>
+        <p:spPr/>
+        <p:txBody>
+          <a:bodyPr>
+            <a:normAutofit/>
+          </a:bodyPr>
+          <a:lstStyle/>
+          <a:p>
+            <a:r>
+              <a:rPr lang="en-US" dirty="0"/>
+              <a:t>Communicate expectations early-on, so you can relate to them in case of conflict.</a:t>
+            </a:r>
+          </a:p>
+          <a:p>
+            <a:r>
+              <a:rPr lang="en-US" dirty="0"/>
+              <a:t>As an alternative strategy to explicit communication: validate expectations early-on with micro milestones (keep it simple, e.g., run a sprint with small yet challenging tasks)</a:t>
+            </a:r>
+          </a:p>
+        </p:txBody>
+      </p:sp>
+      <p:sp>
+        <p:nvSpPr>
+          <p:cNvPr id="4" name="Slide Number Placeholder 3">
+            <a:extLst>
+              <a:ext uri="{FF2B5EF4-FFF2-40B4-BE49-F238E27FC236}">
+                <a16:creationId xmlns:a16="http://schemas.microsoft.com/office/drawing/2014/main" id="{E5188A07-3DEA-0DCD-951F-43AA59D65642}"/>
+              </a:ext>
+            </a:extLst>
+          </p:cNvPr>
           <p:cNvSpPr>
             <a:spLocks noGrp="1"/>
           </p:cNvSpPr>
@@ -6103,6 +6173,83 @@
               <a:rPr lang="en-US" smtClean="0"/>
               <a:pPr algn="l"/>
               <a:t>14</a:t>
+            </a:fld>
+            <a:endParaRPr lang="en-US" dirty="0"/>
+          </a:p>
+        </p:txBody>
+      </p:sp>
+    </p:spTree>
+    <p:extLst>
+      <p:ext uri="{BB962C8B-B14F-4D97-AF65-F5344CB8AC3E}">
+        <p14:creationId xmlns:p14="http://schemas.microsoft.com/office/powerpoint/2010/main" val="2745352305"/>
+      </p:ext>
+    </p:extLst>
+  </p:cSld>
+  <p:clrMapOvr>
+    <a:masterClrMapping/>
+  </p:clrMapOvr>
+</p:sld>
+</file>
+
+<file path=ppt/slides/slide15.xml><?xml version="1.0" encoding="utf-8"?>
+<p:sld xmlns:a="http://schemas.openxmlformats.org/drawingml/2006/main" xmlns:r="http://schemas.openxmlformats.org/officeDocument/2006/relationships" xmlns:p="http://schemas.openxmlformats.org/presentationml/2006/main">
+  <p:cSld>
+    <p:spTree>
+      <p:nvGrpSpPr>
+        <p:cNvPr id="1" name=""/>
+        <p:cNvGrpSpPr/>
+        <p:nvPr/>
+      </p:nvGrpSpPr>
+      <p:grpSpPr>
+        <a:xfrm>
+          <a:off x="0" y="0"/>
+          <a:ext cx="0" cy="0"/>
+          <a:chOff x="0" y="0"/>
+          <a:chExt cx="0" cy="0"/>
+        </a:xfrm>
+      </p:grpSpPr>
+      <p:sp>
+        <p:nvSpPr>
+          <p:cNvPr id="2" name="Title 1"/>
+          <p:cNvSpPr>
+            <a:spLocks noGrp="1"/>
+          </p:cNvSpPr>
+          <p:nvPr>
+            <p:ph type="title"/>
+          </p:nvPr>
+        </p:nvSpPr>
+        <p:spPr/>
+        <p:txBody>
+          <a:bodyPr/>
+          <a:lstStyle/>
+          <a:p>
+            <a:r>
+              <a:rPr lang="en-US" dirty="0"/>
+              <a:t>Stakeholder Management</a:t>
+            </a:r>
+          </a:p>
+        </p:txBody>
+      </p:sp>
+      <p:sp>
+        <p:nvSpPr>
+          <p:cNvPr id="4" name="Slide Number Placeholder 3"/>
+          <p:cNvSpPr>
+            <a:spLocks noGrp="1"/>
+          </p:cNvSpPr>
+          <p:nvPr>
+            <p:ph type="sldNum" sz="quarter" idx="12"/>
+          </p:nvPr>
+        </p:nvSpPr>
+        <p:spPr/>
+        <p:txBody>
+          <a:bodyPr/>
+          <a:lstStyle/>
+          <a:p>
+            <a:pPr algn="l"/>
+            <a:fld id="{11CDFDCC-1F45-4E80-8B17-15DA0BDDC059}" type="slidenum">
+              <a:rPr lang="en-US" smtClean="0"/>
+              <a:pPr algn="l"/>
+              <a:t>15</a:t>
             </a:fld>
             <a:endParaRPr lang="en-US" dirty="0"/>
           </a:p>
@@ -7037,131 +7184,6 @@
 </p:sld>
 </file>
 
-<file path=ppt/slides/slide15.xml><?xml version="1.0" encoding="utf-8"?>
-<p:sld xmlns:a="http://schemas.openxmlformats.org/drawingml/2006/main" xmlns:r="http://schemas.openxmlformats.org/officeDocument/2006/relationships" xmlns:p="http://schemas.openxmlformats.org/presentationml/2006/main">
-  <p:cSld>
-    <p:spTree>
-      <p:nvGrpSpPr>
-        <p:cNvPr id="1" name=""/>
-        <p:cNvGrpSpPr/>
-        <p:nvPr/>
-      </p:nvGrpSpPr>
-      <p:grpSpPr>
-        <a:xfrm>
-          <a:off x="0" y="0"/>
-          <a:ext cx="0" cy="0"/>
-          <a:chOff x="0" y="0"/>
-          <a:chExt cx="0" cy="0"/>
-        </a:xfrm>
-      </p:grpSpPr>
-      <p:sp>
-        <p:nvSpPr>
-          <p:cNvPr id="2" name="Title 1">
-            <a:extLst>
-              <a:ext uri="{FF2B5EF4-FFF2-40B4-BE49-F238E27FC236}">
-                <a16:creationId xmlns:a16="http://schemas.microsoft.com/office/drawing/2014/main" id="{E6A5A86B-5747-34FF-24D0-C181298EA89D}"/>
-              </a:ext>
-            </a:extLst>
-          </p:cNvPr>
-          <p:cNvSpPr>
-            <a:spLocks noGrp="1"/>
-          </p:cNvSpPr>
-          <p:nvPr>
-            <p:ph type="title"/>
-          </p:nvPr>
-        </p:nvSpPr>
-        <p:spPr/>
-        <p:txBody>
-          <a:bodyPr/>
-          <a:lstStyle/>
-          <a:p>
-            <a:r>
-              <a:rPr lang="en-US" dirty="0"/>
-              <a:t>Tricks and Tools</a:t>
-            </a:r>
-          </a:p>
-        </p:txBody>
-      </p:sp>
-      <p:sp>
-        <p:nvSpPr>
-          <p:cNvPr id="3" name="Content Placeholder 2">
-            <a:extLst>
-              <a:ext uri="{FF2B5EF4-FFF2-40B4-BE49-F238E27FC236}">
-                <a16:creationId xmlns:a16="http://schemas.microsoft.com/office/drawing/2014/main" id="{FA9BBDEC-6991-56BD-FE0B-55E8B393BD8C}"/>
-              </a:ext>
-            </a:extLst>
-          </p:cNvPr>
-          <p:cNvSpPr>
-            <a:spLocks noGrp="1"/>
-          </p:cNvSpPr>
-          <p:nvPr>
-            <p:ph idx="1"/>
-          </p:nvPr>
-        </p:nvSpPr>
-        <p:spPr/>
-        <p:txBody>
-          <a:bodyPr/>
-          <a:lstStyle/>
-          <a:p>
-            <a:r>
-              <a:rPr lang="en-US" dirty="0"/>
-              <a:t>Talk openly to stakeholders: What are your expectations? Only this allows you to obtain </a:t>
-            </a:r>
-            <a:r>
-              <a:rPr lang="en-US" u="sng" dirty="0"/>
-              <a:t>actionable</a:t>
-            </a:r>
-            <a:r>
-              <a:rPr lang="en-US" dirty="0"/>
-              <a:t> intelligence.</a:t>
-            </a:r>
-          </a:p>
-        </p:txBody>
-      </p:sp>
-      <p:sp>
-        <p:nvSpPr>
-          <p:cNvPr id="4" name="Slide Number Placeholder 3">
-            <a:extLst>
-              <a:ext uri="{FF2B5EF4-FFF2-40B4-BE49-F238E27FC236}">
-                <a16:creationId xmlns:a16="http://schemas.microsoft.com/office/drawing/2014/main" id="{E5188A07-3DEA-0DCD-951F-43AA59D65642}"/>
-              </a:ext>
-            </a:extLst>
-          </p:cNvPr>
-          <p:cNvSpPr>
-            <a:spLocks noGrp="1"/>
-          </p:cNvSpPr>
-          <p:nvPr>
-            <p:ph type="sldNum" sz="quarter" idx="12"/>
-          </p:nvPr>
-        </p:nvSpPr>
-        <p:spPr/>
-        <p:txBody>
-          <a:bodyPr/>
-          <a:lstStyle/>
-          <a:p>
-            <a:pPr algn="l"/>
-            <a:fld id="{11CDFDCC-1F45-4E80-8B17-15DA0BDDC059}" type="slidenum">
-              <a:rPr lang="en-US" smtClean="0"/>
-              <a:pPr algn="l"/>
-              <a:t>15</a:t>
-            </a:fld>
-            <a:endParaRPr lang="en-US" dirty="0"/>
-          </a:p>
-        </p:txBody>
-      </p:sp>
-    </p:spTree>
-    <p:extLst>
-      <p:ext uri="{BB962C8B-B14F-4D97-AF65-F5344CB8AC3E}">
-        <p14:creationId xmlns:p14="http://schemas.microsoft.com/office/powerpoint/2010/main" val="1256594865"/>
-      </p:ext>
-    </p:extLst>
-  </p:cSld>
-  <p:clrMapOvr>
-    <a:masterClrMapping/>
-  </p:clrMapOvr>
-</p:sld>
-</file>
-
 <file path=ppt/slides/slide16.xml><?xml version="1.0" encoding="utf-8"?>
 <p:sld xmlns:a="http://schemas.openxmlformats.org/drawingml/2006/main" xmlns:r="http://schemas.openxmlformats.org/officeDocument/2006/relationships" xmlns:p="http://schemas.openxmlformats.org/presentationml/2006/main">
   <p:cSld>
@@ -7181,7 +7203,41 @@
       </p:grpSpPr>
       <p:sp>
         <p:nvSpPr>
-          <p:cNvPr id="3" name="Content Placeholder 2"/>
+          <p:cNvPr id="2" name="Title 1">
+            <a:extLst>
+              <a:ext uri="{FF2B5EF4-FFF2-40B4-BE49-F238E27FC236}">
+                <a16:creationId xmlns:a16="http://schemas.microsoft.com/office/drawing/2014/main" id="{E6A5A86B-5747-34FF-24D0-C181298EA89D}"/>
+              </a:ext>
+            </a:extLst>
+          </p:cNvPr>
+          <p:cNvSpPr>
+            <a:spLocks noGrp="1"/>
+          </p:cNvSpPr>
+          <p:nvPr>
+            <p:ph type="title"/>
+          </p:nvPr>
+        </p:nvSpPr>
+        <p:spPr/>
+        <p:txBody>
+          <a:bodyPr/>
+          <a:lstStyle/>
+          <a:p>
+            <a:r>
+              <a:rPr lang="en-US" dirty="0"/>
+              <a:t>Tricks and Tools</a:t>
+            </a:r>
+          </a:p>
+        </p:txBody>
+      </p:sp>
+      <p:sp>
+        <p:nvSpPr>
+          <p:cNvPr id="3" name="Content Placeholder 2">
+            <a:extLst>
+              <a:ext uri="{FF2B5EF4-FFF2-40B4-BE49-F238E27FC236}">
+                <a16:creationId xmlns:a16="http://schemas.microsoft.com/office/drawing/2014/main" id="{FA9BBDEC-6991-56BD-FE0B-55E8B393BD8C}"/>
+              </a:ext>
+            </a:extLst>
+          </p:cNvPr>
           <p:cNvSpPr>
             <a:spLocks noGrp="1"/>
           </p:cNvSpPr>
@@ -7191,101 +7247,33 @@
         </p:nvSpPr>
         <p:spPr/>
         <p:txBody>
-          <a:bodyPr>
-            <a:normAutofit/>
-          </a:bodyPr>
-          <a:lstStyle/>
-          <a:p>
-            <a:r>
-              <a:rPr lang="en-US" dirty="0"/>
-              <a:t>Steps in a conflict:</a:t>
-            </a:r>
-          </a:p>
-          <a:p>
-            <a:pPr lvl="1"/>
-            <a:r>
-              <a:rPr lang="en-US" dirty="0"/>
-              <a:t>Participants solve the conflict by themselves. Suggest a conflict discussion.</a:t>
-            </a:r>
-          </a:p>
-          <a:p>
-            <a:pPr lvl="1"/>
-            <a:r>
-              <a:rPr lang="en-US" dirty="0"/>
-              <a:t>Conflict discussion</a:t>
-            </a:r>
-          </a:p>
-          <a:p>
-            <a:pPr lvl="1"/>
-            <a:r>
-              <a:rPr lang="en-US" dirty="0"/>
-              <a:t>“Clarification bridge”:</a:t>
-            </a:r>
-          </a:p>
-          <a:p>
-            <a:pPr lvl="2"/>
-            <a:r>
-              <a:rPr lang="en-US" dirty="0"/>
-              <a:t>self explanation</a:t>
-            </a:r>
-          </a:p>
-          <a:p>
-            <a:pPr lvl="2"/>
-            <a:r>
-              <a:rPr lang="en-US" dirty="0"/>
-              <a:t>diagnosis</a:t>
-            </a:r>
-          </a:p>
-          <a:p>
-            <a:pPr lvl="2"/>
-            <a:r>
-              <a:rPr lang="en-US" dirty="0"/>
-              <a:t>dialogue</a:t>
-            </a:r>
-          </a:p>
-          <a:p>
-            <a:pPr lvl="1"/>
-            <a:r>
-              <a:rPr lang="en-US" dirty="0"/>
-              <a:t>Exit: If the conflict cannot be solved, the project must be protected from the conflict. The conflict participants must leave the project.</a:t>
-            </a:r>
-          </a:p>
-          <a:p>
-            <a:pPr marL="0" indent="0">
-              <a:buNone/>
-            </a:pPr>
-            <a:r>
-              <a:rPr lang="en-US" dirty="0"/>
-              <a:t>Note: An organization without healthy conflicts does likely not have objectives.</a:t>
-            </a:r>
-          </a:p>
-        </p:txBody>
-      </p:sp>
-      <p:sp>
-        <p:nvSpPr>
-          <p:cNvPr id="2" name="Title 1"/>
-          <p:cNvSpPr>
-            <a:spLocks noGrp="1"/>
-          </p:cNvSpPr>
-          <p:nvPr>
-            <p:ph type="title"/>
-          </p:nvPr>
-        </p:nvSpPr>
-        <p:spPr/>
-        <p:txBody>
           <a:bodyPr/>
           <a:lstStyle/>
           <a:p>
             <a:r>
               <a:rPr lang="en-US" dirty="0"/>
-              <a:t>Conflict Management</a:t>
-            </a:r>
-          </a:p>
-        </p:txBody>
-      </p:sp>
-      <p:sp>
-        <p:nvSpPr>
-          <p:cNvPr id="4" name="Slide Number Placeholder 3"/>
+              <a:t>Talk openly to stakeholders: What are your expectations? Only this allows you to obtain </a:t>
+            </a:r>
+            <a:r>
+              <a:rPr lang="en-US" u="sng" dirty="0"/>
+              <a:t>actionable</a:t>
+            </a:r>
+            <a:r>
+              <a:rPr lang="en-US" dirty="0"/>
+              <a:t> intelligence.</a:t>
+            </a:r>
+          </a:p>
+        </p:txBody>
+      </p:sp>
+      <p:sp>
+        <p:nvSpPr>
+          <p:cNvPr id="4" name="Slide Number Placeholder 3">
+            <a:extLst>
+              <a:ext uri="{FF2B5EF4-FFF2-40B4-BE49-F238E27FC236}">
+                <a16:creationId xmlns:a16="http://schemas.microsoft.com/office/drawing/2014/main" id="{E5188A07-3DEA-0DCD-951F-43AA59D65642}"/>
+              </a:ext>
+            </a:extLst>
+          </p:cNvPr>
           <p:cNvSpPr>
             <a:spLocks noGrp="1"/>
           </p:cNvSpPr>
@@ -7311,7 +7299,7 @@
     </p:spTree>
     <p:extLst>
       <p:ext uri="{BB962C8B-B14F-4D97-AF65-F5344CB8AC3E}">
-        <p14:creationId xmlns:p14="http://schemas.microsoft.com/office/powerpoint/2010/main" val="1723862130"/>
+        <p14:creationId xmlns:p14="http://schemas.microsoft.com/office/powerpoint/2010/main" val="1256594865"/>
       </p:ext>
     </p:extLst>
   </p:cSld>
@@ -7351,31 +7339,71 @@
         <p:spPr/>
         <p:txBody>
           <a:bodyPr>
-            <a:normAutofit fontScale="92500"/>
+            <a:normAutofit/>
           </a:bodyPr>
           <a:lstStyle/>
           <a:p>
             <a:r>
               <a:rPr lang="en-US" dirty="0"/>
-              <a:t>How to avoid badmouthing: resolve conflicts directly (not indirectly). Use proven (razer sharp) arguments, no presumptions or vague insinuations. Note that this is a great effort, but it pays off.</a:t>
-            </a:r>
-          </a:p>
-          <a:p>
-            <a:r>
-              <a:rPr lang="en-US" dirty="0"/>
-              <a:t>Conflict resolution in case of expectation violations: make sure to have set an expectation benchmark.</a:t>
-            </a:r>
-          </a:p>
-          <a:p>
-            <a:r>
-              <a:rPr lang="en-US" dirty="0"/>
-              <a:t>Seek conflicts: Have the courage to state the own needs and problems (example: when management/ internal customers change directions all the time, middle management needs to raise the conflict).</a:t>
-            </a:r>
-          </a:p>
-          <a:p>
-            <a:r>
-              <a:rPr lang="en-US" dirty="0"/>
-              <a:t>Question behaviors and learn from experienced peers: Habits are often based on rationale conclusions from experiences made in the past. With experienced peers, use their wisdom to reach the common objective most efficiently, identify the essential interfaces for collaboration.</a:t>
+              <a:t>Steps in a conflict:</a:t>
+            </a:r>
+          </a:p>
+          <a:p>
+            <a:pPr lvl="1"/>
+            <a:r>
+              <a:rPr lang="en-US" dirty="0"/>
+              <a:t>Participants solve the conflict by themselves. Suggest a conflict discussion.</a:t>
+            </a:r>
+          </a:p>
+          <a:p>
+            <a:pPr lvl="1"/>
+            <a:r>
+              <a:rPr lang="en-US" dirty="0"/>
+              <a:t>Conflict discussion</a:t>
+            </a:r>
+          </a:p>
+          <a:p>
+            <a:pPr lvl="1"/>
+            <a:r>
+              <a:rPr lang="en-US" dirty="0"/>
+              <a:t>“Clarification bridge”:</a:t>
+            </a:r>
+          </a:p>
+          <a:p>
+            <a:pPr lvl="2"/>
+            <a:r>
+              <a:rPr lang="en-US" dirty="0"/>
+              <a:t>self explanation</a:t>
+            </a:r>
+          </a:p>
+          <a:p>
+            <a:pPr lvl="2"/>
+            <a:r>
+              <a:rPr lang="en-US" dirty="0"/>
+              <a:t>diagnosis</a:t>
+            </a:r>
+          </a:p>
+          <a:p>
+            <a:pPr lvl="2"/>
+            <a:r>
+              <a:rPr lang="en-US" dirty="0"/>
+              <a:t>dialogue</a:t>
+            </a:r>
+          </a:p>
+          <a:p>
+            <a:pPr lvl="1"/>
+            <a:r>
+              <a:rPr lang="en-US" dirty="0"/>
+              <a:t>Exit: If the conflict cannot be solved, the project must be protected from the conflict. The conflict participants must leave the project.</a:t>
+            </a:r>
+          </a:p>
+          <a:p>
+            <a:pPr marL="0" indent="0">
+              <a:buNone/>
+            </a:pPr>
+            <a:r>
+              <a:rPr lang="en-US" dirty="0"/>
+              <a:t>Note: An organization without healthy conflicts does likely not have objectives.</a:t>
             </a:r>
           </a:p>
         </p:txBody>
@@ -7397,7 +7425,7 @@
           <a:p>
             <a:r>
               <a:rPr lang="en-US" dirty="0"/>
-              <a:t>Tricks and Tools</a:t>
+              <a:t>Conflict Management</a:t>
             </a:r>
           </a:p>
         </p:txBody>
@@ -7430,7 +7458,7 @@
     </p:spTree>
     <p:extLst>
       <p:ext uri="{BB962C8B-B14F-4D97-AF65-F5344CB8AC3E}">
-        <p14:creationId xmlns:p14="http://schemas.microsoft.com/office/powerpoint/2010/main" val="1601236925"/>
+        <p14:creationId xmlns:p14="http://schemas.microsoft.com/office/powerpoint/2010/main" val="1723862130"/>
       </p:ext>
     </p:extLst>
   </p:cSld>
@@ -7470,128 +7498,31 @@
         <p:spPr/>
         <p:txBody>
           <a:bodyPr>
-            <a:normAutofit fontScale="70000" lnSpcReduction="20000"/>
+            <a:normAutofit fontScale="92500"/>
           </a:bodyPr>
           <a:lstStyle/>
           <a:p>
             <a:r>
               <a:rPr lang="en-US" dirty="0"/>
-              <a:t>Purpose, Process, Payoff</a:t>
-            </a:r>
-          </a:p>
-          <a:p>
-            <a:pPr lvl="1"/>
-            <a:r>
-              <a:rPr lang="en-US" dirty="0"/>
-              <a:t>Communicate in the invitation</a:t>
-            </a:r>
-          </a:p>
-          <a:p>
-            <a:r>
-              <a:rPr lang="en-US" dirty="0"/>
-              <a:t>Types</a:t>
-            </a:r>
-          </a:p>
-          <a:p>
-            <a:pPr lvl="1"/>
-            <a:r>
-              <a:rPr lang="en-US" dirty="0"/>
-              <a:t>informative</a:t>
-            </a:r>
-          </a:p>
-          <a:p>
-            <a:pPr lvl="1"/>
-            <a:r>
-              <a:rPr lang="en-US" dirty="0"/>
-              <a:t>management (planning/reporting)</a:t>
-            </a:r>
-          </a:p>
-          <a:p>
-            <a:pPr lvl="1"/>
-            <a:r>
-              <a:rPr lang="en-US" dirty="0"/>
-              <a:t>problem solving (creative/ brainstorming)</a:t>
-            </a:r>
-          </a:p>
-          <a:p>
-            <a:pPr lvl="1"/>
-            <a:r>
-              <a:rPr lang="en-US" dirty="0"/>
-              <a:t>productive (work session)</a:t>
-            </a:r>
-          </a:p>
-          <a:p>
-            <a:r>
-              <a:rPr lang="en-US" dirty="0"/>
-              <a:t>Maker's Schedule, Manager's Schedule</a:t>
-            </a:r>
-          </a:p>
-          <a:p>
-            <a:pPr lvl="1"/>
-            <a:r>
-              <a:rPr lang="en-US" dirty="0"/>
-              <a:t>Make sure not to interrupt the schedules of the makers</a:t>
-            </a:r>
-          </a:p>
-          <a:p>
-            <a:r>
-              <a:rPr lang="en-US" dirty="0"/>
-              <a:t>Delegate roles</a:t>
-            </a:r>
-          </a:p>
-          <a:p>
-            <a:pPr lvl="1"/>
-            <a:r>
-              <a:rPr lang="en-US" dirty="0"/>
-              <a:t>Preparations</a:t>
-            </a:r>
-          </a:p>
-          <a:p>
-            <a:pPr lvl="1"/>
-            <a:r>
-              <a:rPr lang="en-US" dirty="0"/>
-              <a:t>Minutes</a:t>
-            </a:r>
-          </a:p>
-          <a:p>
-            <a:pPr lvl="1"/>
-            <a:r>
-              <a:rPr lang="en-US" dirty="0"/>
-              <a:t>Action items</a:t>
-            </a:r>
-          </a:p>
-          <a:p>
-            <a:pPr lvl="1"/>
-            <a:r>
-              <a:rPr lang="en-US" dirty="0"/>
-              <a:t>Visualization</a:t>
-            </a:r>
-          </a:p>
-          <a:p>
-            <a:pPr lvl="1"/>
-            <a:r>
-              <a:rPr lang="en-US" dirty="0"/>
-              <a:t>Feedback provider (ask participant to provide feedback in the wrap-up)</a:t>
-            </a:r>
-          </a:p>
-          <a:p>
-            <a:r>
-              <a:rPr lang="en-US" dirty="0"/>
-              <a:t>Document results (SMART)</a:t>
-            </a:r>
-          </a:p>
-          <a:p>
-            <a:pPr lvl="1"/>
-            <a:r>
-              <a:rPr lang="en-US" dirty="0"/>
-              <a:t>After each item, formulate and record results in the MOM</a:t>
-            </a:r>
-          </a:p>
-          <a:p>
-            <a:pPr lvl="1"/>
-            <a:r>
-              <a:rPr lang="en-US" dirty="0"/>
-              <a:t>Share minutes right after the meeting</a:t>
+              <a:t>How to avoid badmouthing: resolve conflicts directly (not indirectly). Use proven (razer sharp) arguments, no presumptions or vague insinuations. Note that this is a great effort, but it pays off.</a:t>
+            </a:r>
+          </a:p>
+          <a:p>
+            <a:r>
+              <a:rPr lang="en-US" dirty="0"/>
+              <a:t>Conflict resolution in case of expectation violations: make sure to have set an expectation benchmark.</a:t>
+            </a:r>
+          </a:p>
+          <a:p>
+            <a:r>
+              <a:rPr lang="en-US" dirty="0"/>
+              <a:t>Seek conflicts: Have the courage to state the own needs and problems (example: when management/ internal customers change directions all the time, middle management needs to raise the conflict).</a:t>
+            </a:r>
+          </a:p>
+          <a:p>
+            <a:r>
+              <a:rPr lang="en-US" dirty="0"/>
+              <a:t>Question behaviors and learn from experienced peers: Habits are often based on rationale conclusions from experiences made in the past. With experienced peers, use their wisdom to reach the common objective most efficiently, identify the essential interfaces for collaboration.</a:t>
             </a:r>
           </a:p>
         </p:txBody>
@@ -7613,7 +7544,7 @@
           <a:p>
             <a:r>
               <a:rPr lang="en-US" dirty="0"/>
-              <a:t>Meetings</a:t>
+              <a:t>Tricks and Tools</a:t>
             </a:r>
           </a:p>
         </p:txBody>
@@ -7646,7 +7577,7 @@
     </p:spTree>
     <p:extLst>
       <p:ext uri="{BB962C8B-B14F-4D97-AF65-F5344CB8AC3E}">
-        <p14:creationId xmlns:p14="http://schemas.microsoft.com/office/powerpoint/2010/main" val="3962400355"/>
+        <p14:creationId xmlns:p14="http://schemas.microsoft.com/office/powerpoint/2010/main" val="1601236925"/>
       </p:ext>
     </p:extLst>
   </p:cSld>
@@ -7686,27 +7617,128 @@
         <p:spPr/>
         <p:txBody>
           <a:bodyPr>
-            <a:normAutofit/>
+            <a:normAutofit fontScale="70000" lnSpcReduction="20000"/>
           </a:bodyPr>
           <a:lstStyle/>
           <a:p>
             <a:r>
               <a:rPr lang="en-US" dirty="0"/>
-              <a:t>Feed forward method (for regular daily/weekly meetings)</a:t>
+              <a:t>Purpose, Process, Payoff</a:t>
             </a:r>
           </a:p>
           <a:p>
             <a:pPr lvl="1"/>
             <a:r>
               <a:rPr lang="en-US" dirty="0"/>
-              <a:t>3 sentences, 2 min per participant</a:t>
+              <a:t>Communicate in the invitation</a:t>
+            </a:r>
+          </a:p>
+          <a:p>
+            <a:r>
+              <a:rPr lang="en-US" dirty="0"/>
+              <a:t>Types</a:t>
             </a:r>
           </a:p>
           <a:p>
             <a:pPr lvl="1"/>
             <a:r>
               <a:rPr lang="en-US" dirty="0"/>
-              <a:t>Each participant reports on current work, successes, problems, help needed.</a:t>
+              <a:t>informative</a:t>
+            </a:r>
+          </a:p>
+          <a:p>
+            <a:pPr lvl="1"/>
+            <a:r>
+              <a:rPr lang="en-US" dirty="0"/>
+              <a:t>management (planning/reporting)</a:t>
+            </a:r>
+          </a:p>
+          <a:p>
+            <a:pPr lvl="1"/>
+            <a:r>
+              <a:rPr lang="en-US" dirty="0"/>
+              <a:t>problem solving (creative/ brainstorming)</a:t>
+            </a:r>
+          </a:p>
+          <a:p>
+            <a:pPr lvl="1"/>
+            <a:r>
+              <a:rPr lang="en-US" dirty="0"/>
+              <a:t>productive (work session)</a:t>
+            </a:r>
+          </a:p>
+          <a:p>
+            <a:r>
+              <a:rPr lang="en-US" dirty="0"/>
+              <a:t>Maker's Schedule, Manager's Schedule</a:t>
+            </a:r>
+          </a:p>
+          <a:p>
+            <a:pPr lvl="1"/>
+            <a:r>
+              <a:rPr lang="en-US" dirty="0"/>
+              <a:t>Make sure not to interrupt the schedules of the makers</a:t>
+            </a:r>
+          </a:p>
+          <a:p>
+            <a:r>
+              <a:rPr lang="en-US" dirty="0"/>
+              <a:t>Delegate roles</a:t>
+            </a:r>
+          </a:p>
+          <a:p>
+            <a:pPr lvl="1"/>
+            <a:r>
+              <a:rPr lang="en-US" dirty="0"/>
+              <a:t>Preparations</a:t>
+            </a:r>
+          </a:p>
+          <a:p>
+            <a:pPr lvl="1"/>
+            <a:r>
+              <a:rPr lang="en-US" dirty="0"/>
+              <a:t>Minutes</a:t>
+            </a:r>
+          </a:p>
+          <a:p>
+            <a:pPr lvl="1"/>
+            <a:r>
+              <a:rPr lang="en-US" dirty="0"/>
+              <a:t>Action items</a:t>
+            </a:r>
+          </a:p>
+          <a:p>
+            <a:pPr lvl="1"/>
+            <a:r>
+              <a:rPr lang="en-US" dirty="0"/>
+              <a:t>Visualization</a:t>
+            </a:r>
+          </a:p>
+          <a:p>
+            <a:pPr lvl="1"/>
+            <a:r>
+              <a:rPr lang="en-US" dirty="0"/>
+              <a:t>Feedback provider (ask participant to provide feedback in the wrap-up)</a:t>
+            </a:r>
+          </a:p>
+          <a:p>
+            <a:r>
+              <a:rPr lang="en-US" dirty="0"/>
+              <a:t>Document results (SMART)</a:t>
+            </a:r>
+          </a:p>
+          <a:p>
+            <a:pPr lvl="1"/>
+            <a:r>
+              <a:rPr lang="en-US" dirty="0"/>
+              <a:t>After each item, formulate and record results in the MOM</a:t>
+            </a:r>
+          </a:p>
+          <a:p>
+            <a:pPr lvl="1"/>
+            <a:r>
+              <a:rPr lang="en-US" dirty="0"/>
+              <a:t>Share minutes right after the meeting</a:t>
             </a:r>
           </a:p>
         </p:txBody>
@@ -7761,7 +7793,7 @@
     </p:spTree>
     <p:extLst>
       <p:ext uri="{BB962C8B-B14F-4D97-AF65-F5344CB8AC3E}">
-        <p14:creationId xmlns:p14="http://schemas.microsoft.com/office/powerpoint/2010/main" val="2238114024"/>
+        <p14:creationId xmlns:p14="http://schemas.microsoft.com/office/powerpoint/2010/main" val="3962400355"/>
       </p:ext>
     </p:extLst>
   </p:cSld>
@@ -8435,74 +8467,27 @@
         <p:spPr/>
         <p:txBody>
           <a:bodyPr>
-            <a:normAutofit lnSpcReduction="10000"/>
+            <a:normAutofit/>
           </a:bodyPr>
           <a:lstStyle/>
           <a:p>
             <a:r>
               <a:rPr lang="en-US" dirty="0"/>
-              <a:t>Spiral of success: people in your environment and places help you stay on course and give you energy</a:t>
-            </a:r>
-          </a:p>
-          <a:p>
-            <a:r>
-              <a:rPr lang="en-US" dirty="0"/>
-              <a:t>Exercise: Draw a balance sheet</a:t>
+              <a:t>Feed forward method (for regular daily/weekly meetings)</a:t>
             </a:r>
           </a:p>
           <a:p>
             <a:pPr lvl="1"/>
             <a:r>
               <a:rPr lang="en-US" dirty="0"/>
-              <a:t>Put yourself in the middle</a:t>
+              <a:t>3 sentences, 2 min per participant</a:t>
             </a:r>
           </a:p>
           <a:p>
             <a:pPr lvl="1"/>
             <a:r>
               <a:rPr lang="en-US" dirty="0"/>
-              <a:t>Draw down the core people around you</a:t>
-            </a:r>
-          </a:p>
-          <a:p>
-            <a:pPr lvl="1"/>
-            <a:r>
-              <a:rPr lang="en-US" dirty="0"/>
-              <a:t>Mark the energy givers and absorbers with +,++,+++ or -, --, ---</a:t>
-            </a:r>
-          </a:p>
-          <a:p>
-            <a:pPr lvl="1"/>
-            <a:r>
-              <a:rPr lang="en-US" dirty="0"/>
-              <a:t>Derive conclusions (e.g. whom to thank/avoid, conflict resolution?)</a:t>
-            </a:r>
-          </a:p>
-          <a:p>
-            <a:r>
-              <a:rPr lang="en-US" dirty="0"/>
-              <a:t>Networking interaction is a means to lead yourself/a team to goals beyond an individual’s perception:</a:t>
-            </a:r>
-          </a:p>
-          <a:p>
-            <a:pPr lvl="1"/>
-            <a:r>
-              <a:rPr lang="en-US" dirty="0"/>
-              <a:t>One cannot be better than one’s self-perceived permits</a:t>
-            </a:r>
-          </a:p>
-          <a:p>
-            <a:pPr lvl="1"/>
-            <a:r>
-              <a:rPr lang="en-US" dirty="0"/>
-              <a:t>Self-perception is also a result of interaction with others</a:t>
-            </a:r>
-          </a:p>
-          <a:p>
-            <a:pPr lvl="1"/>
-            <a:r>
-              <a:rPr lang="en-US" dirty="0"/>
-              <a:t>New perspectives needed to break one’s own logic</a:t>
+              <a:t>Each participant reports on current work, successes, problems, help needed.</a:t>
             </a:r>
           </a:p>
         </p:txBody>
@@ -8524,7 +8509,7 @@
           <a:p>
             <a:r>
               <a:rPr lang="en-US" dirty="0"/>
-              <a:t>Spiral of Success</a:t>
+              <a:t>Meetings</a:t>
             </a:r>
           </a:p>
         </p:txBody>
@@ -8557,7 +8542,7 @@
     </p:spTree>
     <p:extLst>
       <p:ext uri="{BB962C8B-B14F-4D97-AF65-F5344CB8AC3E}">
-        <p14:creationId xmlns:p14="http://schemas.microsoft.com/office/powerpoint/2010/main" val="966689178"/>
+        <p14:creationId xmlns:p14="http://schemas.microsoft.com/office/powerpoint/2010/main" val="2238114024"/>
       </p:ext>
     </p:extLst>
   </p:cSld>
@@ -8597,39 +8582,74 @@
         <p:spPr/>
         <p:txBody>
           <a:bodyPr>
-            <a:normAutofit/>
+            <a:normAutofit lnSpcReduction="10000"/>
           </a:bodyPr>
           <a:lstStyle/>
           <a:p>
             <a:r>
               <a:rPr lang="en-US" dirty="0"/>
-              <a:t>Define Point A (situation)</a:t>
-            </a:r>
-            <a:br>
-              <a:rPr lang="en-US" dirty="0"/>
-            </a:br>
-            <a:r>
-              <a:rPr lang="en-US" dirty="0"/>
-              <a:t>Problem statement, e.g. “no business”</a:t>
-            </a:r>
-          </a:p>
-          <a:p>
-            <a:r>
-              <a:rPr lang="en-US" dirty="0"/>
-              <a:t>Define Point B (alternative)</a:t>
-            </a:r>
-            <a:br>
-              <a:rPr lang="en-US" dirty="0"/>
-            </a:br>
-            <a:r>
-              <a:rPr lang="en-US" dirty="0"/>
-              <a:t>Specify the alternative, e.g. what it means to have business</a:t>
-            </a:r>
-          </a:p>
-          <a:p>
-            <a:r>
-              <a:rPr lang="en-US" dirty="0"/>
-              <a:t>Draw steps from Point A to Point B</a:t>
+              <a:t>Spiral of success: people in your environment and places help you stay on course and give you energy</a:t>
+            </a:r>
+          </a:p>
+          <a:p>
+            <a:r>
+              <a:rPr lang="en-US" dirty="0"/>
+              <a:t>Exercise: Draw a balance sheet</a:t>
+            </a:r>
+          </a:p>
+          <a:p>
+            <a:pPr lvl="1"/>
+            <a:r>
+              <a:rPr lang="en-US" dirty="0"/>
+              <a:t>Put yourself in the middle</a:t>
+            </a:r>
+          </a:p>
+          <a:p>
+            <a:pPr lvl="1"/>
+            <a:r>
+              <a:rPr lang="en-US" dirty="0"/>
+              <a:t>Draw down the core people around you</a:t>
+            </a:r>
+          </a:p>
+          <a:p>
+            <a:pPr lvl="1"/>
+            <a:r>
+              <a:rPr lang="en-US" dirty="0"/>
+              <a:t>Mark the energy givers and absorbers with +,++,+++ or -, --, ---</a:t>
+            </a:r>
+          </a:p>
+          <a:p>
+            <a:pPr lvl="1"/>
+            <a:r>
+              <a:rPr lang="en-US" dirty="0"/>
+              <a:t>Derive conclusions (e.g. whom to thank/avoid, conflict resolution?)</a:t>
+            </a:r>
+          </a:p>
+          <a:p>
+            <a:r>
+              <a:rPr lang="en-US" dirty="0"/>
+              <a:t>Networking interaction is a means to lead yourself/a team to goals beyond an individual’s perception:</a:t>
+            </a:r>
+          </a:p>
+          <a:p>
+            <a:pPr lvl="1"/>
+            <a:r>
+              <a:rPr lang="en-US" dirty="0"/>
+              <a:t>One cannot be better than one’s self-perceived permits</a:t>
+            </a:r>
+          </a:p>
+          <a:p>
+            <a:pPr lvl="1"/>
+            <a:r>
+              <a:rPr lang="en-US" dirty="0"/>
+              <a:t>Self-perception is also a result of interaction with others</a:t>
+            </a:r>
+          </a:p>
+          <a:p>
+            <a:pPr lvl="1"/>
+            <a:r>
+              <a:rPr lang="en-US" dirty="0"/>
+              <a:t>New perspectives needed to break one’s own logic</a:t>
             </a:r>
           </a:p>
         </p:txBody>
@@ -8651,7 +8671,7 @@
           <a:p>
             <a:r>
               <a:rPr lang="en-US" dirty="0"/>
-              <a:t>Problem Solving through Alternatives</a:t>
+              <a:t>Spiral of Success</a:t>
             </a:r>
           </a:p>
         </p:txBody>
@@ -8684,7 +8704,7 @@
     </p:spTree>
     <p:extLst>
       <p:ext uri="{BB962C8B-B14F-4D97-AF65-F5344CB8AC3E}">
-        <p14:creationId xmlns:p14="http://schemas.microsoft.com/office/powerpoint/2010/main" val="3129071132"/>
+        <p14:creationId xmlns:p14="http://schemas.microsoft.com/office/powerpoint/2010/main" val="966689178"/>
       </p:ext>
     </p:extLst>
   </p:cSld>
@@ -8730,28 +8750,33 @@
           <a:p>
             <a:r>
               <a:rPr lang="en-US" dirty="0"/>
-              <a:t>Basic questions to ask:</a:t>
-            </a:r>
-          </a:p>
-          <a:p>
-            <a:pPr lvl="1"/>
-            <a:r>
-              <a:rPr lang="en-US" dirty="0"/>
-              <a:t>Which tasks belong to the most important 20% of my tasks?</a:t>
-            </a:r>
-          </a:p>
-          <a:p>
-            <a:pPr lvl="1"/>
-            <a:r>
-              <a:rPr lang="en-US" dirty="0"/>
-              <a:t>Who can do these tasks better/ faster than me?</a:t>
-            </a:r>
-          </a:p>
-          <a:p>
-            <a:pPr lvl="1"/>
-            <a:r>
-              <a:rPr lang="en-US" dirty="0"/>
-              <a:t>Which employees have the potential capacity to do them?</a:t>
+              <a:t>Define Point A (situation)</a:t>
+            </a:r>
+            <a:br>
+              <a:rPr lang="en-US" dirty="0"/>
+            </a:br>
+            <a:r>
+              <a:rPr lang="en-US" dirty="0"/>
+              <a:t>Problem statement, e.g. “no business”</a:t>
+            </a:r>
+          </a:p>
+          <a:p>
+            <a:r>
+              <a:rPr lang="en-US" dirty="0"/>
+              <a:t>Define Point B (alternative)</a:t>
+            </a:r>
+            <a:br>
+              <a:rPr lang="en-US" dirty="0"/>
+            </a:br>
+            <a:r>
+              <a:rPr lang="en-US" dirty="0"/>
+              <a:t>Specify the alternative, e.g. what it means to have business</a:t>
+            </a:r>
+          </a:p>
+          <a:p>
+            <a:r>
+              <a:rPr lang="en-US" dirty="0"/>
+              <a:t>Draw steps from Point A to Point B</a:t>
             </a:r>
           </a:p>
         </p:txBody>
@@ -8773,7 +8798,7 @@
           <a:p>
             <a:r>
               <a:rPr lang="en-US" dirty="0"/>
-              <a:t>Delegating</a:t>
+              <a:t>Problem Solving through Alternatives</a:t>
             </a:r>
           </a:p>
         </p:txBody>
@@ -8806,7 +8831,7 @@
     </p:spTree>
     <p:extLst>
       <p:ext uri="{BB962C8B-B14F-4D97-AF65-F5344CB8AC3E}">
-        <p14:creationId xmlns:p14="http://schemas.microsoft.com/office/powerpoint/2010/main" val="1272220114"/>
+        <p14:creationId xmlns:p14="http://schemas.microsoft.com/office/powerpoint/2010/main" val="3129071132"/>
       </p:ext>
     </p:extLst>
   </p:cSld>
@@ -8846,96 +8871,34 @@
         <p:spPr/>
         <p:txBody>
           <a:bodyPr>
-            <a:normAutofit fontScale="92500" lnSpcReduction="10000"/>
+            <a:normAutofit/>
           </a:bodyPr>
           <a:lstStyle/>
           <a:p>
             <a:r>
               <a:rPr lang="en-US" dirty="0"/>
-              <a:t>Task definition for delegation:</a:t>
+              <a:t>Basic questions to ask:</a:t>
             </a:r>
           </a:p>
           <a:p>
             <a:pPr lvl="1"/>
             <a:r>
               <a:rPr lang="en-US" dirty="0"/>
-              <a:t>What (objective, level of difficulty)</a:t>
+              <a:t>Which tasks belong to the most important 20% of my tasks?</a:t>
             </a:r>
           </a:p>
           <a:p>
             <a:pPr lvl="1"/>
             <a:r>
               <a:rPr lang="en-US" dirty="0"/>
-              <a:t>Who (competency, prerequisites)</a:t>
+              <a:t>Who can do these tasks better/ faster than me?</a:t>
             </a:r>
           </a:p>
           <a:p>
             <a:pPr lvl="1"/>
             <a:r>
               <a:rPr lang="en-US" dirty="0"/>
-              <a:t>What for (purpose, objective, who takes responsibility?)</a:t>
-            </a:r>
-          </a:p>
-          <a:p>
-            <a:pPr lvl="1"/>
-            <a:r>
-              <a:rPr lang="en-US" dirty="0"/>
-              <a:t>How (process, execution, feedback)</a:t>
-            </a:r>
-          </a:p>
-          <a:p>
-            <a:pPr lvl="1"/>
-            <a:r>
-              <a:rPr lang="en-US" dirty="0"/>
-              <a:t>With what (tools, resources)</a:t>
-            </a:r>
-          </a:p>
-          <a:p>
-            <a:pPr lvl="1"/>
-            <a:r>
-              <a:rPr lang="en-US" dirty="0"/>
-              <a:t>When (start, end, priority)</a:t>
-            </a:r>
-          </a:p>
-          <a:p>
-            <a:r>
-              <a:rPr lang="en-US" dirty="0"/>
-              <a:t>Guideline to delegate a task:</a:t>
-            </a:r>
-          </a:p>
-          <a:p>
-            <a:pPr lvl="1"/>
-            <a:r>
-              <a:rPr lang="en-US" dirty="0"/>
-              <a:t>Preparation (explain the objective, reason, qualifications of the employee)</a:t>
-            </a:r>
-          </a:p>
-          <a:p>
-            <a:pPr lvl="1"/>
-            <a:r>
-              <a:rPr lang="en-US" dirty="0"/>
-              <a:t>Orientation (reason to delegate, meeting objective)</a:t>
-            </a:r>
-          </a:p>
-          <a:p>
-            <a:pPr lvl="1"/>
-            <a:r>
-              <a:rPr lang="en-US" dirty="0"/>
-              <a:t>Clarification (explain task type, agree on task (what/who/..), measures, actions, control of success, documentation)</a:t>
-            </a:r>
-          </a:p>
-          <a:p>
-            <a:pPr lvl="1"/>
-            <a:r>
-              <a:rPr lang="en-US" dirty="0"/>
-              <a:t>Anchoring (who by when and what)</a:t>
-            </a:r>
-          </a:p>
-          <a:p>
-            <a:pPr lvl="1"/>
-            <a:r>
-              <a:rPr lang="en-US" dirty="0"/>
-              <a:t>Conclusion (summarize meeting results)</a:t>
+              <a:t>Which employees have the potential capacity to do them?</a:t>
             </a:r>
           </a:p>
         </p:txBody>
@@ -8990,7 +8953,7 @@
     </p:spTree>
     <p:extLst>
       <p:ext uri="{BB962C8B-B14F-4D97-AF65-F5344CB8AC3E}">
-        <p14:creationId xmlns:p14="http://schemas.microsoft.com/office/powerpoint/2010/main" val="2170637327"/>
+        <p14:creationId xmlns:p14="http://schemas.microsoft.com/office/powerpoint/2010/main" val="1272220114"/>
       </p:ext>
     </p:extLst>
   </p:cSld>
@@ -9030,19 +8993,96 @@
         <p:spPr/>
         <p:txBody>
           <a:bodyPr>
-            <a:normAutofit/>
+            <a:normAutofit fontScale="92500" lnSpcReduction="10000"/>
           </a:bodyPr>
           <a:lstStyle/>
           <a:p>
             <a:r>
               <a:rPr lang="en-US" dirty="0"/>
-              <a:t>Read about the effects of sleep/ food intake/ caffeine/ exercise. Understand your biological rhythm.</a:t>
-            </a:r>
-          </a:p>
-          <a:p>
-            <a:r>
-              <a:rPr lang="en-US" dirty="0"/>
-              <a:t>Schedule your intake and activities accordingly.</a:t>
+              <a:t>Task definition for delegation:</a:t>
+            </a:r>
+          </a:p>
+          <a:p>
+            <a:pPr lvl="1"/>
+            <a:r>
+              <a:rPr lang="en-US" dirty="0"/>
+              <a:t>What (objective, level of difficulty)</a:t>
+            </a:r>
+          </a:p>
+          <a:p>
+            <a:pPr lvl="1"/>
+            <a:r>
+              <a:rPr lang="en-US" dirty="0"/>
+              <a:t>Who (competency, prerequisites)</a:t>
+            </a:r>
+          </a:p>
+          <a:p>
+            <a:pPr lvl="1"/>
+            <a:r>
+              <a:rPr lang="en-US" dirty="0"/>
+              <a:t>What for (purpose, objective, who takes responsibility?)</a:t>
+            </a:r>
+          </a:p>
+          <a:p>
+            <a:pPr lvl="1"/>
+            <a:r>
+              <a:rPr lang="en-US" dirty="0"/>
+              <a:t>How (process, execution, feedback)</a:t>
+            </a:r>
+          </a:p>
+          <a:p>
+            <a:pPr lvl="1"/>
+            <a:r>
+              <a:rPr lang="en-US" dirty="0"/>
+              <a:t>With what (tools, resources)</a:t>
+            </a:r>
+          </a:p>
+          <a:p>
+            <a:pPr lvl="1"/>
+            <a:r>
+              <a:rPr lang="en-US" dirty="0"/>
+              <a:t>When (start, end, priority)</a:t>
+            </a:r>
+          </a:p>
+          <a:p>
+            <a:r>
+              <a:rPr lang="en-US" dirty="0"/>
+              <a:t>Guideline to delegate a task:</a:t>
+            </a:r>
+          </a:p>
+          <a:p>
+            <a:pPr lvl="1"/>
+            <a:r>
+              <a:rPr lang="en-US" dirty="0"/>
+              <a:t>Preparation (explain the objective, reason, qualifications of the employee)</a:t>
+            </a:r>
+          </a:p>
+          <a:p>
+            <a:pPr lvl="1"/>
+            <a:r>
+              <a:rPr lang="en-US" dirty="0"/>
+              <a:t>Orientation (reason to delegate, meeting objective)</a:t>
+            </a:r>
+          </a:p>
+          <a:p>
+            <a:pPr lvl="1"/>
+            <a:r>
+              <a:rPr lang="en-US" dirty="0"/>
+              <a:t>Clarification (explain task type, agree on task (what/who/..), measures, actions, control of success, documentation)</a:t>
+            </a:r>
+          </a:p>
+          <a:p>
+            <a:pPr lvl="1"/>
+            <a:r>
+              <a:rPr lang="en-US" dirty="0"/>
+              <a:t>Anchoring (who by when and what)</a:t>
+            </a:r>
+          </a:p>
+          <a:p>
+            <a:pPr lvl="1"/>
+            <a:r>
+              <a:rPr lang="en-US" dirty="0"/>
+              <a:t>Conclusion (summarize meeting results)</a:t>
             </a:r>
           </a:p>
         </p:txBody>
@@ -9064,7 +9104,7 @@
           <a:p>
             <a:r>
               <a:rPr lang="en-US" dirty="0"/>
-              <a:t>Chemicals</a:t>
+              <a:t>Delegating</a:t>
             </a:r>
           </a:p>
         </p:txBody>
@@ -9097,7 +9137,7 @@
     </p:spTree>
     <p:extLst>
       <p:ext uri="{BB962C8B-B14F-4D97-AF65-F5344CB8AC3E}">
-        <p14:creationId xmlns:p14="http://schemas.microsoft.com/office/powerpoint/2010/main" val="4021125665"/>
+        <p14:creationId xmlns:p14="http://schemas.microsoft.com/office/powerpoint/2010/main" val="2170637327"/>
       </p:ext>
     </p:extLst>
   </p:cSld>
@@ -9143,48 +9183,13 @@
           <a:p>
             <a:r>
               <a:rPr lang="en-US" dirty="0"/>
-              <a:t>Baseline culture:</a:t>
-            </a:r>
-          </a:p>
-          <a:p>
-            <a:pPr lvl="1"/>
-            <a:r>
-              <a:rPr lang="en-US" dirty="0"/>
-              <a:t>Criticize negatives, ignore positives</a:t>
-            </a:r>
-          </a:p>
-          <a:p>
-            <a:r>
-              <a:rPr lang="en-US" dirty="0"/>
-              <a:t>Alternative culture: </a:t>
-            </a:r>
-          </a:p>
-          <a:p>
-            <a:pPr lvl="1"/>
-            <a:r>
-              <a:rPr lang="en-US" dirty="0"/>
-              <a:t>Highlight, work and penetrate on pain points</a:t>
-            </a:r>
-            <a:br>
-              <a:rPr lang="en-US" dirty="0"/>
-            </a:br>
-            <a:r>
-              <a:rPr lang="en-US" dirty="0"/>
-              <a:t>(of oneself and others)</a:t>
-            </a:r>
-          </a:p>
-          <a:p>
-            <a:pPr lvl="1"/>
-            <a:r>
-              <a:rPr lang="en-US" dirty="0"/>
-              <a:t>Give positive feedback, highlight and celebrate positives</a:t>
-            </a:r>
-          </a:p>
-          <a:p>
-            <a:pPr lvl="1"/>
-            <a:r>
-              <a:rPr lang="en-US" dirty="0"/>
-              <a:t>Effectively move discourse to the relevant points</a:t>
+              <a:t>Read about the effects of sleep/ food intake/ caffeine/ exercise. Understand your biological rhythm.</a:t>
+            </a:r>
+          </a:p>
+          <a:p>
+            <a:r>
+              <a:rPr lang="en-US" dirty="0"/>
+              <a:t>Schedule your intake and activities accordingly.</a:t>
             </a:r>
           </a:p>
         </p:txBody>
@@ -9206,7 +9211,7 @@
           <a:p>
             <a:r>
               <a:rPr lang="en-US" dirty="0"/>
-              <a:t>Culture</a:t>
+              <a:t>Caffeine</a:t>
             </a:r>
           </a:p>
         </p:txBody>
@@ -9231,6 +9236,438 @@
               <a:rPr lang="en-US" smtClean="0"/>
               <a:pPr algn="l"/>
               <a:t>25</a:t>
+            </a:fld>
+            <a:endParaRPr lang="en-US" dirty="0"/>
+          </a:p>
+        </p:txBody>
+      </p:sp>
+    </p:spTree>
+    <p:extLst>
+      <p:ext uri="{BB962C8B-B14F-4D97-AF65-F5344CB8AC3E}">
+        <p14:creationId xmlns:p14="http://schemas.microsoft.com/office/powerpoint/2010/main" val="4021125665"/>
+      </p:ext>
+    </p:extLst>
+  </p:cSld>
+  <p:clrMapOvr>
+    <a:masterClrMapping/>
+  </p:clrMapOvr>
+</p:sld>
+</file>
+
+<file path=ppt/slides/slide26.xml><?xml version="1.0" encoding="utf-8"?>
+<p:sld xmlns:a="http://schemas.openxmlformats.org/drawingml/2006/main" xmlns:r="http://schemas.openxmlformats.org/officeDocument/2006/relationships" xmlns:p="http://schemas.openxmlformats.org/presentationml/2006/main">
+  <p:cSld>
+    <p:spTree>
+      <p:nvGrpSpPr>
+        <p:cNvPr id="1" name=""/>
+        <p:cNvGrpSpPr/>
+        <p:nvPr/>
+      </p:nvGrpSpPr>
+      <p:grpSpPr>
+        <a:xfrm>
+          <a:off x="0" y="0"/>
+          <a:ext cx="0" cy="0"/>
+          <a:chOff x="0" y="0"/>
+          <a:chExt cx="0" cy="0"/>
+        </a:xfrm>
+      </p:grpSpPr>
+      <p:pic>
+        <p:nvPicPr>
+          <p:cNvPr id="5" name="Content Placeholder 4">
+            <a:extLst>
+              <a:ext uri="{FF2B5EF4-FFF2-40B4-BE49-F238E27FC236}">
+                <a16:creationId xmlns:a16="http://schemas.microsoft.com/office/drawing/2014/main" id="{CF557FCF-BBF2-543A-0975-55CC14314B43}"/>
+              </a:ext>
+            </a:extLst>
+          </p:cNvPr>
+          <p:cNvPicPr>
+            <a:picLocks noGrp="1" noChangeAspect="1"/>
+          </p:cNvPicPr>
+          <p:nvPr>
+            <p:ph idx="1"/>
+          </p:nvPr>
+        </p:nvPicPr>
+        <p:blipFill>
+          <a:blip r:embed="rId2"/>
+          <a:stretch>
+            <a:fillRect/>
+          </a:stretch>
+        </p:blipFill>
+        <p:spPr>
+          <a:xfrm>
+            <a:off x="3002313" y="1825625"/>
+            <a:ext cx="6187373" cy="4351338"/>
+          </a:xfrm>
+          <a:prstGeom prst="rect">
+            <a:avLst/>
+          </a:prstGeom>
+        </p:spPr>
+      </p:pic>
+      <p:sp>
+        <p:nvSpPr>
+          <p:cNvPr id="2" name="Title 1"/>
+          <p:cNvSpPr>
+            <a:spLocks noGrp="1"/>
+          </p:cNvSpPr>
+          <p:nvPr>
+            <p:ph type="title"/>
+          </p:nvPr>
+        </p:nvSpPr>
+        <p:spPr/>
+        <p:txBody>
+          <a:bodyPr/>
+          <a:lstStyle/>
+          <a:p>
+            <a:r>
+              <a:rPr lang="en-US" dirty="0"/>
+              <a:t>Caffeine</a:t>
+            </a:r>
+          </a:p>
+        </p:txBody>
+      </p:sp>
+      <p:sp>
+        <p:nvSpPr>
+          <p:cNvPr id="4" name="Slide Number Placeholder 3"/>
+          <p:cNvSpPr>
+            <a:spLocks noGrp="1"/>
+          </p:cNvSpPr>
+          <p:nvPr>
+            <p:ph type="sldNum" sz="quarter" idx="12"/>
+          </p:nvPr>
+        </p:nvSpPr>
+        <p:spPr/>
+        <p:txBody>
+          <a:bodyPr/>
+          <a:lstStyle/>
+          <a:p>
+            <a:pPr algn="l"/>
+            <a:fld id="{11CDFDCC-1F45-4E80-8B17-15DA0BDDC059}" type="slidenum">
+              <a:rPr lang="en-US" smtClean="0"/>
+              <a:pPr algn="l"/>
+              <a:t>26</a:t>
+            </a:fld>
+            <a:endParaRPr lang="en-US" dirty="0"/>
+          </a:p>
+        </p:txBody>
+      </p:sp>
+      <p:sp>
+        <p:nvSpPr>
+          <p:cNvPr id="9" name="TextBox 8">
+            <a:extLst>
+              <a:ext uri="{FF2B5EF4-FFF2-40B4-BE49-F238E27FC236}">
+                <a16:creationId xmlns:a16="http://schemas.microsoft.com/office/drawing/2014/main" id="{0A934375-6B72-1EB7-E7F7-B9BB55ED74FF}"/>
+              </a:ext>
+            </a:extLst>
+          </p:cNvPr>
+          <p:cNvSpPr txBox="1"/>
+          <p:nvPr/>
+        </p:nvSpPr>
+        <p:spPr>
+          <a:xfrm rot="16200000">
+            <a:off x="691377" y="3838853"/>
+            <a:ext cx="3791414" cy="369332"/>
+          </a:xfrm>
+          <a:prstGeom prst="rect">
+            <a:avLst/>
+          </a:prstGeom>
+          <a:noFill/>
+        </p:spPr>
+        <p:txBody>
+          <a:bodyPr wrap="square">
+            <a:spAutoFit/>
+          </a:bodyPr>
+          <a:lstStyle/>
+          <a:p>
+            <a:pPr algn="ctr"/>
+            <a:r>
+              <a:rPr lang="en-US" dirty="0"/>
+              <a:t>https://2b-alert-web.bhsai.org</a:t>
+            </a:r>
+          </a:p>
+        </p:txBody>
+      </p:sp>
+    </p:spTree>
+    <p:extLst>
+      <p:ext uri="{BB962C8B-B14F-4D97-AF65-F5344CB8AC3E}">
+        <p14:creationId xmlns:p14="http://schemas.microsoft.com/office/powerpoint/2010/main" val="218467599"/>
+      </p:ext>
+    </p:extLst>
+  </p:cSld>
+  <p:clrMapOvr>
+    <a:masterClrMapping/>
+  </p:clrMapOvr>
+</p:sld>
+</file>
+
+<file path=ppt/slides/slide27.xml><?xml version="1.0" encoding="utf-8"?>
+<p:sld xmlns:a="http://schemas.openxmlformats.org/drawingml/2006/main" xmlns:r="http://schemas.openxmlformats.org/officeDocument/2006/relationships" xmlns:p="http://schemas.openxmlformats.org/presentationml/2006/main">
+  <p:cSld>
+    <p:spTree>
+      <p:nvGrpSpPr>
+        <p:cNvPr id="1" name=""/>
+        <p:cNvGrpSpPr/>
+        <p:nvPr/>
+      </p:nvGrpSpPr>
+      <p:grpSpPr>
+        <a:xfrm>
+          <a:off x="0" y="0"/>
+          <a:ext cx="0" cy="0"/>
+          <a:chOff x="0" y="0"/>
+          <a:chExt cx="0" cy="0"/>
+        </a:xfrm>
+      </p:grpSpPr>
+      <p:sp>
+        <p:nvSpPr>
+          <p:cNvPr id="2" name="Title 1"/>
+          <p:cNvSpPr>
+            <a:spLocks noGrp="1"/>
+          </p:cNvSpPr>
+          <p:nvPr>
+            <p:ph type="title"/>
+          </p:nvPr>
+        </p:nvSpPr>
+        <p:spPr/>
+        <p:txBody>
+          <a:bodyPr/>
+          <a:lstStyle/>
+          <a:p>
+            <a:r>
+              <a:rPr lang="en-US" dirty="0"/>
+              <a:t>Caffeine</a:t>
+            </a:r>
+          </a:p>
+        </p:txBody>
+      </p:sp>
+      <p:sp>
+        <p:nvSpPr>
+          <p:cNvPr id="4" name="Slide Number Placeholder 3"/>
+          <p:cNvSpPr>
+            <a:spLocks noGrp="1"/>
+          </p:cNvSpPr>
+          <p:nvPr>
+            <p:ph type="sldNum" sz="quarter" idx="12"/>
+          </p:nvPr>
+        </p:nvSpPr>
+        <p:spPr/>
+        <p:txBody>
+          <a:bodyPr/>
+          <a:lstStyle/>
+          <a:p>
+            <a:pPr algn="l"/>
+            <a:fld id="{11CDFDCC-1F45-4E80-8B17-15DA0BDDC059}" type="slidenum">
+              <a:rPr lang="en-US" smtClean="0"/>
+              <a:pPr algn="l"/>
+              <a:t>27</a:t>
+            </a:fld>
+            <a:endParaRPr lang="en-US" dirty="0"/>
+          </a:p>
+        </p:txBody>
+      </p:sp>
+      <p:sp>
+        <p:nvSpPr>
+          <p:cNvPr id="9" name="TextBox 8">
+            <a:extLst>
+              <a:ext uri="{FF2B5EF4-FFF2-40B4-BE49-F238E27FC236}">
+                <a16:creationId xmlns:a16="http://schemas.microsoft.com/office/drawing/2014/main" id="{0A934375-6B72-1EB7-E7F7-B9BB55ED74FF}"/>
+              </a:ext>
+            </a:extLst>
+          </p:cNvPr>
+          <p:cNvSpPr txBox="1"/>
+          <p:nvPr/>
+        </p:nvSpPr>
+        <p:spPr>
+          <a:xfrm rot="16200000">
+            <a:off x="691377" y="3838853"/>
+            <a:ext cx="3791414" cy="369332"/>
+          </a:xfrm>
+          <a:prstGeom prst="rect">
+            <a:avLst/>
+          </a:prstGeom>
+          <a:noFill/>
+        </p:spPr>
+        <p:txBody>
+          <a:bodyPr wrap="square">
+            <a:spAutoFit/>
+          </a:bodyPr>
+          <a:lstStyle/>
+          <a:p>
+            <a:pPr algn="ctr"/>
+            <a:r>
+              <a:rPr lang="en-US" dirty="0"/>
+              <a:t>https://2b-alert-web.bhsai.org</a:t>
+            </a:r>
+          </a:p>
+        </p:txBody>
+      </p:sp>
+      <p:pic>
+        <p:nvPicPr>
+          <p:cNvPr id="7" name="Content Placeholder 6">
+            <a:extLst>
+              <a:ext uri="{FF2B5EF4-FFF2-40B4-BE49-F238E27FC236}">
+                <a16:creationId xmlns:a16="http://schemas.microsoft.com/office/drawing/2014/main" id="{9DE59F62-7BAF-112B-D908-078D00CA36C6}"/>
+              </a:ext>
+            </a:extLst>
+          </p:cNvPr>
+          <p:cNvPicPr>
+            <a:picLocks noGrp="1" noChangeAspect="1"/>
+          </p:cNvPicPr>
+          <p:nvPr>
+            <p:ph idx="1"/>
+          </p:nvPr>
+        </p:nvPicPr>
+        <p:blipFill>
+          <a:blip r:embed="rId2"/>
+          <a:stretch>
+            <a:fillRect/>
+          </a:stretch>
+        </p:blipFill>
+        <p:spPr>
+          <a:xfrm>
+            <a:off x="2970581" y="1825625"/>
+            <a:ext cx="6250838" cy="4351338"/>
+          </a:xfrm>
+          <a:prstGeom prst="rect">
+            <a:avLst/>
+          </a:prstGeom>
+        </p:spPr>
+      </p:pic>
+    </p:spTree>
+    <p:extLst>
+      <p:ext uri="{BB962C8B-B14F-4D97-AF65-F5344CB8AC3E}">
+        <p14:creationId xmlns:p14="http://schemas.microsoft.com/office/powerpoint/2010/main" val="2140137847"/>
+      </p:ext>
+    </p:extLst>
+  </p:cSld>
+  <p:clrMapOvr>
+    <a:masterClrMapping/>
+  </p:clrMapOvr>
+</p:sld>
+</file>
+
+<file path=ppt/slides/slide28.xml><?xml version="1.0" encoding="utf-8"?>
+<p:sld xmlns:a="http://schemas.openxmlformats.org/drawingml/2006/main" xmlns:r="http://schemas.openxmlformats.org/officeDocument/2006/relationships" xmlns:p="http://schemas.openxmlformats.org/presentationml/2006/main">
+  <p:cSld>
+    <p:spTree>
+      <p:nvGrpSpPr>
+        <p:cNvPr id="1" name=""/>
+        <p:cNvGrpSpPr/>
+        <p:nvPr/>
+      </p:nvGrpSpPr>
+      <p:grpSpPr>
+        <a:xfrm>
+          <a:off x="0" y="0"/>
+          <a:ext cx="0" cy="0"/>
+          <a:chOff x="0" y="0"/>
+          <a:chExt cx="0" cy="0"/>
+        </a:xfrm>
+      </p:grpSpPr>
+      <p:sp>
+        <p:nvSpPr>
+          <p:cNvPr id="3" name="Content Placeholder 2"/>
+          <p:cNvSpPr>
+            <a:spLocks noGrp="1"/>
+          </p:cNvSpPr>
+          <p:nvPr>
+            <p:ph idx="1"/>
+          </p:nvPr>
+        </p:nvSpPr>
+        <p:spPr/>
+        <p:txBody>
+          <a:bodyPr>
+            <a:normAutofit/>
+          </a:bodyPr>
+          <a:lstStyle/>
+          <a:p>
+            <a:r>
+              <a:rPr lang="en-US" dirty="0"/>
+              <a:t>Baseline culture:</a:t>
+            </a:r>
+          </a:p>
+          <a:p>
+            <a:pPr lvl="1"/>
+            <a:r>
+              <a:rPr lang="en-US" dirty="0"/>
+              <a:t>Criticize negatives, ignore positives</a:t>
+            </a:r>
+          </a:p>
+          <a:p>
+            <a:r>
+              <a:rPr lang="en-US" dirty="0"/>
+              <a:t>Alternative culture: </a:t>
+            </a:r>
+          </a:p>
+          <a:p>
+            <a:pPr lvl="1"/>
+            <a:r>
+              <a:rPr lang="en-US" dirty="0"/>
+              <a:t>Highlight, work and penetrate on pain points</a:t>
+            </a:r>
+            <a:br>
+              <a:rPr lang="en-US" dirty="0"/>
+            </a:br>
+            <a:r>
+              <a:rPr lang="en-US" dirty="0"/>
+              <a:t>(of oneself and others)</a:t>
+            </a:r>
+          </a:p>
+          <a:p>
+            <a:pPr lvl="1"/>
+            <a:r>
+              <a:rPr lang="en-US" dirty="0"/>
+              <a:t>Give positive feedback, highlight and celebrate positives</a:t>
+            </a:r>
+          </a:p>
+          <a:p>
+            <a:pPr lvl="1"/>
+            <a:r>
+              <a:rPr lang="en-US" dirty="0"/>
+              <a:t>Effectively move discourse to the relevant points</a:t>
+            </a:r>
+          </a:p>
+        </p:txBody>
+      </p:sp>
+      <p:sp>
+        <p:nvSpPr>
+          <p:cNvPr id="2" name="Title 1"/>
+          <p:cNvSpPr>
+            <a:spLocks noGrp="1"/>
+          </p:cNvSpPr>
+          <p:nvPr>
+            <p:ph type="title"/>
+          </p:nvPr>
+        </p:nvSpPr>
+        <p:spPr/>
+        <p:txBody>
+          <a:bodyPr/>
+          <a:lstStyle/>
+          <a:p>
+            <a:r>
+              <a:rPr lang="en-US" dirty="0"/>
+              <a:t>Culture</a:t>
+            </a:r>
+          </a:p>
+        </p:txBody>
+      </p:sp>
+      <p:sp>
+        <p:nvSpPr>
+          <p:cNvPr id="4" name="Slide Number Placeholder 3"/>
+          <p:cNvSpPr>
+            <a:spLocks noGrp="1"/>
+          </p:cNvSpPr>
+          <p:nvPr>
+            <p:ph type="sldNum" sz="quarter" idx="12"/>
+          </p:nvPr>
+        </p:nvSpPr>
+        <p:spPr/>
+        <p:txBody>
+          <a:bodyPr/>
+          <a:lstStyle/>
+          <a:p>
+            <a:pPr algn="l"/>
+            <a:fld id="{11CDFDCC-1F45-4E80-8B17-15DA0BDDC059}" type="slidenum">
+              <a:rPr lang="en-US" smtClean="0"/>
+              <a:pPr algn="l"/>
+              <a:t>28</a:t>
             </a:fld>
             <a:endParaRPr lang="en-US" dirty="0"/>
           </a:p>
@@ -9254,7 +9691,13 @@
   <p:cSld>
     <p:spTree>
       <p:nvGrpSpPr>
-        <p:cNvPr id="1" name=""/>
+        <p:cNvPr id="1" name="">
+          <a:extLst>
+            <a:ext uri="{FF2B5EF4-FFF2-40B4-BE49-F238E27FC236}">
+              <a16:creationId xmlns:a16="http://schemas.microsoft.com/office/drawing/2014/main" id="{C3D6B6F0-D02F-2087-2CBC-0334678ACD87}"/>
+            </a:ext>
+          </a:extLst>
+        </p:cNvPr>
         <p:cNvGrpSpPr/>
         <p:nvPr/>
       </p:nvGrpSpPr>
@@ -9268,7 +9711,13 @@
       </p:grpSpPr>
       <p:sp>
         <p:nvSpPr>
-          <p:cNvPr id="3" name="Content Placeholder 2"/>
+          <p:cNvPr id="3" name="Content Placeholder 2">
+            <a:extLst>
+              <a:ext uri="{FF2B5EF4-FFF2-40B4-BE49-F238E27FC236}">
+                <a16:creationId xmlns:a16="http://schemas.microsoft.com/office/drawing/2014/main" id="{69B92534-B1EB-2175-562F-EF209F33986C}"/>
+              </a:ext>
+            </a:extLst>
+          </p:cNvPr>
           <p:cNvSpPr>
             <a:spLocks noGrp="1"/>
           </p:cNvSpPr>
@@ -9279,7 +9728,7 @@
         <p:spPr/>
         <p:txBody>
           <a:bodyPr>
-            <a:normAutofit lnSpcReduction="10000"/>
+            <a:normAutofit/>
           </a:bodyPr>
           <a:lstStyle/>
           <a:p>
@@ -9308,62 +9757,17 @@
               <a:t>Validation: try to consciously apply these styles in micro situations</a:t>
             </a:r>
           </a:p>
-          <a:p>
-            <a:r>
-              <a:rPr lang="en-US" dirty="0"/>
-              <a:t>Team size: max. 7 to 8</a:t>
-            </a:r>
-          </a:p>
-          <a:p>
-            <a:pPr lvl="1"/>
-            <a:r>
-              <a:rPr lang="en-US" dirty="0"/>
-              <a:t>Beyond that, well-defined roles and structures are needed</a:t>
-            </a:r>
-          </a:p>
-          <a:p>
-            <a:r>
-              <a:rPr lang="en-US" dirty="0"/>
-              <a:t>To build a team, every team needs to go through 4 phases:</a:t>
-            </a:r>
-          </a:p>
-          <a:p>
-            <a:pPr lvl="1"/>
-            <a:r>
-              <a:rPr lang="en-US" dirty="0"/>
-              <a:t>Forming</a:t>
-            </a:r>
-          </a:p>
-          <a:p>
-            <a:pPr lvl="1"/>
-            <a:r>
-              <a:rPr lang="en-US" dirty="0"/>
-              <a:t>Storming (conflict phase, battle/ positioning)</a:t>
-            </a:r>
-          </a:p>
-          <a:p>
-            <a:pPr lvl="1"/>
-            <a:r>
-              <a:rPr lang="en-US" dirty="0"/>
-              <a:t>Norming (create familiarity)</a:t>
-            </a:r>
-          </a:p>
-          <a:p>
-            <a:pPr lvl="1"/>
-            <a:r>
-              <a:rPr lang="en-US" dirty="0"/>
-              <a:t>Performing (constructive collaboration)</a:t>
-            </a:r>
-          </a:p>
-          <a:p>
-            <a:pPr lvl="1"/>
-            <a:endParaRPr lang="en-US" dirty="0"/>
-          </a:p>
-        </p:txBody>
-      </p:sp>
-      <p:sp>
-        <p:nvSpPr>
-          <p:cNvPr id="2" name="Title 1"/>
+        </p:txBody>
+      </p:sp>
+      <p:sp>
+        <p:nvSpPr>
+          <p:cNvPr id="2" name="Title 1">
+            <a:extLst>
+              <a:ext uri="{FF2B5EF4-FFF2-40B4-BE49-F238E27FC236}">
+                <a16:creationId xmlns:a16="http://schemas.microsoft.com/office/drawing/2014/main" id="{8487E842-2A58-FCAA-1FA0-EBE716682567}"/>
+              </a:ext>
+            </a:extLst>
+          </p:cNvPr>
           <p:cNvSpPr>
             <a:spLocks noGrp="1"/>
           </p:cNvSpPr>
@@ -9378,14 +9782,20 @@
           <a:p>
             <a:r>
               <a:rPr lang="en-US" dirty="0"/>
-              <a:t>Tricks and Tools</a:t>
-            </a:r>
-          </a:p>
-        </p:txBody>
-      </p:sp>
-      <p:sp>
-        <p:nvSpPr>
-          <p:cNvPr id="4" name="Slide Number Placeholder 3"/>
+              <a:t>Leadership Styles</a:t>
+            </a:r>
+          </a:p>
+        </p:txBody>
+      </p:sp>
+      <p:sp>
+        <p:nvSpPr>
+          <p:cNvPr id="4" name="Slide Number Placeholder 3">
+            <a:extLst>
+              <a:ext uri="{FF2B5EF4-FFF2-40B4-BE49-F238E27FC236}">
+                <a16:creationId xmlns:a16="http://schemas.microsoft.com/office/drawing/2014/main" id="{B1390C34-A9EE-A4E5-1CFB-0A378F008543}"/>
+              </a:ext>
+            </a:extLst>
+          </p:cNvPr>
           <p:cNvSpPr>
             <a:spLocks noGrp="1"/>
           </p:cNvSpPr>
@@ -9411,7 +9821,7 @@
     </p:spTree>
     <p:extLst>
       <p:ext uri="{BB962C8B-B14F-4D97-AF65-F5344CB8AC3E}">
-        <p14:creationId xmlns:p14="http://schemas.microsoft.com/office/powerpoint/2010/main" val="3094666999"/>
+        <p14:creationId xmlns:p14="http://schemas.microsoft.com/office/powerpoint/2010/main" val="1744911683"/>
       </p:ext>
     </p:extLst>
   </p:cSld>
@@ -9440,143 +9850,104 @@
       </p:grpSpPr>
       <p:sp>
         <p:nvSpPr>
-          <p:cNvPr id="2" name="Title 1">
-            <a:extLst>
-              <a:ext uri="{FF2B5EF4-FFF2-40B4-BE49-F238E27FC236}">
-                <a16:creationId xmlns:a16="http://schemas.microsoft.com/office/drawing/2014/main" id="{E6A5A86B-5747-34FF-24D0-C181298EA89D}"/>
-              </a:ext>
-            </a:extLst>
-          </p:cNvPr>
-          <p:cNvSpPr>
-            <a:spLocks noGrp="1"/>
-          </p:cNvSpPr>
-          <p:nvPr>
-            <p:ph type="title"/>
+          <p:cNvPr id="3" name="Content Placeholder 2"/>
+          <p:cNvSpPr>
+            <a:spLocks noGrp="1"/>
+          </p:cNvSpPr>
+          <p:nvPr>
+            <p:ph idx="1"/>
           </p:nvPr>
         </p:nvSpPr>
         <p:spPr/>
         <p:txBody>
-          <a:bodyPr/>
-          <a:lstStyle/>
-          <a:p>
-            <a:r>
-              <a:rPr lang="en-US" dirty="0"/>
-              <a:t>Teams</a:t>
-            </a:r>
-          </a:p>
-        </p:txBody>
-      </p:sp>
-      <p:sp>
-        <p:nvSpPr>
-          <p:cNvPr id="3" name="Content Placeholder 2">
-            <a:extLst>
-              <a:ext uri="{FF2B5EF4-FFF2-40B4-BE49-F238E27FC236}">
-                <a16:creationId xmlns:a16="http://schemas.microsoft.com/office/drawing/2014/main" id="{FA9BBDEC-6991-56BD-FE0B-55E8B393BD8C}"/>
-              </a:ext>
-            </a:extLst>
-          </p:cNvPr>
-          <p:cNvSpPr>
-            <a:spLocks noGrp="1"/>
-          </p:cNvSpPr>
-          <p:nvPr>
-            <p:ph idx="1"/>
-          </p:nvPr>
-        </p:nvSpPr>
-        <p:spPr/>
-        <p:txBody>
-          <a:bodyPr/>
-          <a:lstStyle/>
-          <a:p>
-            <a:r>
-              <a:rPr lang="en-US" dirty="0"/>
-              <a:t>Visualization method to create a team:</a:t>
+          <a:bodyPr>
+            <a:normAutofit/>
+          </a:bodyPr>
+          <a:lstStyle/>
+          <a:p>
+            <a:r>
+              <a:rPr lang="en-US" dirty="0"/>
+              <a:t>Know when to work as a team: if you want to travel fast, travel alone. If you want to embark on a long journey, travel together.</a:t>
+            </a:r>
+          </a:p>
+          <a:p>
+            <a:r>
+              <a:rPr lang="en-US" dirty="0"/>
+              <a:t>Team size: max. 7 to 8</a:t>
             </a:r>
           </a:p>
           <a:p>
             <a:pPr lvl="1"/>
             <a:r>
               <a:rPr lang="en-US" dirty="0"/>
-              <a:t>Who belongs to the core team?</a:t>
+              <a:t>Beyond that, well-defined roles and structures are needed</a:t>
+            </a:r>
+          </a:p>
+          <a:p>
+            <a:r>
+              <a:rPr lang="en-US" dirty="0"/>
+              <a:t>To build a team, every team needs to go through 4 phases:</a:t>
             </a:r>
           </a:p>
           <a:p>
             <a:pPr lvl="1"/>
             <a:r>
               <a:rPr lang="en-US" dirty="0"/>
-              <a:t>Which areas, departments, projects contribute to the results?</a:t>
+              <a:t>Forming</a:t>
             </a:r>
           </a:p>
           <a:p>
             <a:pPr lvl="1"/>
             <a:r>
               <a:rPr lang="en-US" dirty="0"/>
-              <a:t>Names of the internal/external customers</a:t>
-            </a:r>
-          </a:p>
-          <a:p>
-            <a:r>
-              <a:rPr lang="en-US" dirty="0"/>
-              <a:t>Mission statement:</a:t>
+              <a:t>Storming (conflict phase, battle/ positioning)</a:t>
             </a:r>
           </a:p>
           <a:p>
             <a:pPr lvl="1"/>
             <a:r>
               <a:rPr lang="en-US" dirty="0"/>
-              <a:t>What is our mission and the primary purpose of the team?</a:t>
+              <a:t>Norming (create familiarity)</a:t>
             </a:r>
           </a:p>
           <a:p>
             <a:pPr lvl="1"/>
             <a:r>
               <a:rPr lang="en-US" dirty="0"/>
-              <a:t>Why do we exist as a team?</a:t>
-            </a:r>
-          </a:p>
-          <a:p>
-            <a:pPr lvl="1"/>
-            <a:r>
-              <a:rPr lang="en-US" dirty="0"/>
-              <a:t>What is our greatest challenge?</a:t>
-            </a:r>
-          </a:p>
-          <a:p>
-            <a:pPr lvl="1"/>
-            <a:r>
-              <a:rPr lang="en-US" dirty="0"/>
-              <a:t>Upon completion of our work as a team, what is the desired result?</a:t>
-            </a:r>
-          </a:p>
-          <a:p>
-            <a:pPr lvl="1"/>
-            <a:r>
-              <a:rPr lang="en-US" dirty="0"/>
-              <a:t>What exactly are the deliverables to our customers?</a:t>
+              <a:t>Performing (constructive collaboration)</a:t>
             </a:r>
           </a:p>
           <a:p>
             <a:pPr lvl="1"/>
             <a:endParaRPr lang="en-US" dirty="0"/>
           </a:p>
-          <a:p>
-            <a:pPr lvl="1"/>
-            <a:endParaRPr lang="en-US" dirty="0"/>
-          </a:p>
-          <a:p>
-            <a:pPr lvl="1"/>
-            <a:endParaRPr lang="en-US" dirty="0"/>
-          </a:p>
-        </p:txBody>
-      </p:sp>
-      <p:sp>
-        <p:nvSpPr>
-          <p:cNvPr id="4" name="Slide Number Placeholder 3">
-            <a:extLst>
-              <a:ext uri="{FF2B5EF4-FFF2-40B4-BE49-F238E27FC236}">
-                <a16:creationId xmlns:a16="http://schemas.microsoft.com/office/drawing/2014/main" id="{E5188A07-3DEA-0DCD-951F-43AA59D65642}"/>
-              </a:ext>
-            </a:extLst>
-          </p:cNvPr>
+        </p:txBody>
+      </p:sp>
+      <p:sp>
+        <p:nvSpPr>
+          <p:cNvPr id="2" name="Title 1"/>
+          <p:cNvSpPr>
+            <a:spLocks noGrp="1"/>
+          </p:cNvSpPr>
+          <p:nvPr>
+            <p:ph type="title"/>
+          </p:nvPr>
+        </p:nvSpPr>
+        <p:spPr/>
+        <p:txBody>
+          <a:bodyPr/>
+          <a:lstStyle/>
+          <a:p>
+            <a:r>
+              <a:rPr lang="en-US" dirty="0"/>
+              <a:t>Teams</a:t>
+            </a:r>
+          </a:p>
+        </p:txBody>
+      </p:sp>
+      <p:sp>
+        <p:nvSpPr>
+          <p:cNvPr id="4" name="Slide Number Placeholder 3"/>
           <p:cNvSpPr>
             <a:spLocks noGrp="1"/>
           </p:cNvSpPr>
@@ -9602,7 +9973,7 @@
     </p:spTree>
     <p:extLst>
       <p:ext uri="{BB962C8B-B14F-4D97-AF65-F5344CB8AC3E}">
-        <p14:creationId xmlns:p14="http://schemas.microsoft.com/office/powerpoint/2010/main" val="632137392"/>
+        <p14:creationId xmlns:p14="http://schemas.microsoft.com/office/powerpoint/2010/main" val="1005229756"/>
       </p:ext>
     </p:extLst>
   </p:cSld>
@@ -9675,123 +10046,75 @@
         </p:nvSpPr>
         <p:spPr/>
         <p:txBody>
-          <a:bodyPr>
-            <a:normAutofit fontScale="92500" lnSpcReduction="10000"/>
-          </a:bodyPr>
-          <a:lstStyle/>
-          <a:p>
-            <a:r>
-              <a:rPr lang="en-US" dirty="0"/>
-              <a:t>Team </a:t>
-            </a:r>
-            <a:r>
-              <a:rPr lang="en-US" dirty="0" err="1"/>
-              <a:t>charta</a:t>
-            </a:r>
-            <a:endParaRPr lang="en-US" dirty="0"/>
+          <a:bodyPr/>
+          <a:lstStyle/>
+          <a:p>
+            <a:r>
+              <a:rPr lang="en-US" dirty="0"/>
+              <a:t>Visualization method to create a team:</a:t>
+            </a:r>
           </a:p>
           <a:p>
             <a:pPr lvl="1"/>
             <a:r>
               <a:rPr lang="en-US" dirty="0"/>
-              <a:t>Identity: team name, members</a:t>
+              <a:t>Who belongs to the core team?</a:t>
             </a:r>
           </a:p>
           <a:p>
             <a:pPr lvl="1"/>
             <a:r>
               <a:rPr lang="en-US" dirty="0"/>
-              <a:t>Mission statement</a:t>
+              <a:t>Which areas, departments, projects contribute to the results?</a:t>
             </a:r>
           </a:p>
           <a:p>
             <a:pPr lvl="1"/>
             <a:r>
               <a:rPr lang="en-US" dirty="0"/>
-              <a:t>Objectives (externally specified objectives and own ambitions)</a:t>
+              <a:t>Names of the internal/external customers</a:t>
+            </a:r>
+          </a:p>
+          <a:p>
+            <a:r>
+              <a:rPr lang="en-US" dirty="0"/>
+              <a:t>Mission statement:</a:t>
             </a:r>
           </a:p>
           <a:p>
             <a:pPr lvl="1"/>
             <a:r>
               <a:rPr lang="en-US" dirty="0"/>
-              <a:t>Common rules:</a:t>
-            </a:r>
-          </a:p>
-          <a:p>
-            <a:pPr lvl="2"/>
-            <a:r>
-              <a:rPr lang="en-US" dirty="0"/>
-              <a:t>Rules to manage the work</a:t>
-            </a:r>
-          </a:p>
-          <a:p>
-            <a:pPr lvl="2"/>
-            <a:r>
-              <a:rPr lang="en-US" dirty="0"/>
-              <a:t>Procedures of team meetings</a:t>
-            </a:r>
-          </a:p>
-          <a:p>
-            <a:pPr lvl="2"/>
-            <a:r>
-              <a:rPr lang="en-US" dirty="0"/>
-              <a:t>General rules of collaboration/communication/cooperation, feedback rules</a:t>
-            </a:r>
-          </a:p>
-          <a:p>
-            <a:pPr lvl="2"/>
-            <a:r>
-              <a:rPr lang="en-US" dirty="0"/>
-              <a:t>Responsibilities (RACI), who contributes with which competencies? How is information shared and by whom?</a:t>
-            </a:r>
-          </a:p>
-          <a:p>
-            <a:pPr lvl="2"/>
-            <a:r>
-              <a:rPr lang="en-US" dirty="0"/>
-              <a:t>How are decisions made?</a:t>
-            </a:r>
-          </a:p>
-          <a:p>
-            <a:pPr lvl="2"/>
-            <a:r>
-              <a:rPr lang="en-US" dirty="0"/>
-              <a:t>What are the interfaces that constitute the team boundary?</a:t>
-            </a:r>
-          </a:p>
-          <a:p>
-            <a:pPr lvl="2"/>
-            <a:r>
-              <a:rPr lang="en-US" dirty="0"/>
-              <a:t>How to measure results?</a:t>
+              <a:t>What is our mission and the primary purpose of the team?</a:t>
             </a:r>
           </a:p>
           <a:p>
             <a:pPr lvl="1"/>
             <a:r>
               <a:rPr lang="en-US" dirty="0"/>
-              <a:t>Execution plan</a:t>
-            </a:r>
-          </a:p>
-          <a:p>
-            <a:pPr lvl="2"/>
-            <a:r>
-              <a:rPr lang="en-US" dirty="0"/>
-              <a:t> What are the milestones and the required means for execution?</a:t>
-            </a:r>
-          </a:p>
-          <a:p>
-            <a:pPr lvl="2"/>
-            <a:endParaRPr lang="en-US" dirty="0"/>
-          </a:p>
-          <a:p>
-            <a:pPr lvl="2"/>
-            <a:endParaRPr lang="en-US" dirty="0"/>
+              <a:t>Why do we exist as a team?</a:t>
+            </a:r>
           </a:p>
           <a:p>
             <a:pPr lvl="1"/>
-            <a:endParaRPr lang="en-US" dirty="0"/>
+            <a:r>
+              <a:rPr lang="en-US" dirty="0"/>
+              <a:t>What is our greatest challenge?</a:t>
+            </a:r>
+          </a:p>
+          <a:p>
+            <a:pPr lvl="1"/>
+            <a:r>
+              <a:rPr lang="en-US" dirty="0"/>
+              <a:t>Upon completion of our work as a team, what is the desired result?</a:t>
+            </a:r>
+          </a:p>
+          <a:p>
+            <a:pPr lvl="1"/>
+            <a:r>
+              <a:rPr lang="en-US" dirty="0"/>
+              <a:t>What exactly are the deliverables to our customers?</a:t>
+            </a:r>
           </a:p>
           <a:p>
             <a:pPr lvl="1"/>
@@ -9841,7 +10164,7 @@
     </p:spTree>
     <p:extLst>
       <p:ext uri="{BB962C8B-B14F-4D97-AF65-F5344CB8AC3E}">
-        <p14:creationId xmlns:p14="http://schemas.microsoft.com/office/powerpoint/2010/main" val="1904560094"/>
+        <p14:creationId xmlns:p14="http://schemas.microsoft.com/office/powerpoint/2010/main" val="632137392"/>
       </p:ext>
     </p:extLst>
   </p:cSld>
@@ -9915,100 +10238,126 @@
         <p:spPr/>
         <p:txBody>
           <a:bodyPr>
-            <a:normAutofit lnSpcReduction="10000"/>
+            <a:normAutofit fontScale="92500" lnSpcReduction="10000"/>
           </a:bodyPr>
           <a:lstStyle/>
           <a:p>
             <a:r>
               <a:rPr lang="en-US" dirty="0"/>
-              <a:t>Dimensions to evaluate for team profiling and development</a:t>
-            </a:r>
+              <a:t>Team </a:t>
+            </a:r>
+            <a:r>
+              <a:rPr lang="en-US" dirty="0" err="1"/>
+              <a:t>charta</a:t>
+            </a:r>
+            <a:endParaRPr lang="en-US" dirty="0"/>
           </a:p>
           <a:p>
             <a:pPr lvl="1"/>
             <a:r>
               <a:rPr lang="en-US" dirty="0"/>
-              <a:t>Motivation</a:t>
+              <a:t>Identity: team name, members</a:t>
             </a:r>
           </a:p>
           <a:p>
             <a:pPr lvl="1"/>
             <a:r>
               <a:rPr lang="en-US" dirty="0"/>
-              <a:t>Communication</a:t>
+              <a:t>Mission statement</a:t>
             </a:r>
           </a:p>
           <a:p>
             <a:pPr lvl="1"/>
             <a:r>
               <a:rPr lang="en-US" dirty="0"/>
-              <a:t>Standards of collaboration/ work ethics</a:t>
+              <a:t>Objectives (externally specified objectives and own ambitions)</a:t>
             </a:r>
           </a:p>
           <a:p>
             <a:pPr lvl="1"/>
             <a:r>
               <a:rPr lang="en-US" dirty="0"/>
-              <a:t>Trust</a:t>
+              <a:t>Common rules:</a:t>
+            </a:r>
+          </a:p>
+          <a:p>
+            <a:pPr lvl="2"/>
+            <a:r>
+              <a:rPr lang="en-US" dirty="0"/>
+              <a:t>Rules to manage the work</a:t>
+            </a:r>
+          </a:p>
+          <a:p>
+            <a:pPr lvl="2"/>
+            <a:r>
+              <a:rPr lang="en-US" dirty="0"/>
+              <a:t>Procedures of team meetings</a:t>
+            </a:r>
+          </a:p>
+          <a:p>
+            <a:pPr lvl="2"/>
+            <a:r>
+              <a:rPr lang="en-US" dirty="0"/>
+              <a:t>General rules of collaboration/communication/cooperation, feedback rules</a:t>
+            </a:r>
+          </a:p>
+          <a:p>
+            <a:pPr lvl="2"/>
+            <a:r>
+              <a:rPr lang="en-US" dirty="0"/>
+              <a:t>Responsibilities (RACI), who contributes with which competencies? How is information shared and by whom?</a:t>
+            </a:r>
+          </a:p>
+          <a:p>
+            <a:pPr lvl="2"/>
+            <a:r>
+              <a:rPr lang="en-US" dirty="0"/>
+              <a:t>How are decisions made?</a:t>
+            </a:r>
+          </a:p>
+          <a:p>
+            <a:pPr lvl="2"/>
+            <a:r>
+              <a:rPr lang="en-US" dirty="0"/>
+              <a:t>What are the interfaces that constitute the team boundary?</a:t>
+            </a:r>
+          </a:p>
+          <a:p>
+            <a:pPr lvl="2"/>
+            <a:r>
+              <a:rPr lang="en-US" dirty="0"/>
+              <a:t>How to measure results?</a:t>
             </a:r>
           </a:p>
           <a:p>
             <a:pPr lvl="1"/>
             <a:r>
               <a:rPr lang="en-US" dirty="0"/>
-              <a:t>Ability to take criticism</a:t>
-            </a:r>
+              <a:t>Execution plan</a:t>
+            </a:r>
+          </a:p>
+          <a:p>
+            <a:pPr lvl="2"/>
+            <a:r>
+              <a:rPr lang="en-US" dirty="0"/>
+              <a:t> What are the milestones and the required means for execution?</a:t>
+            </a:r>
+          </a:p>
+          <a:p>
+            <a:pPr lvl="2"/>
+            <a:endParaRPr lang="en-US" dirty="0"/>
+          </a:p>
+          <a:p>
+            <a:pPr lvl="2"/>
+            <a:endParaRPr lang="en-US" dirty="0"/>
           </a:p>
           <a:p>
             <a:pPr lvl="1"/>
-            <a:r>
-              <a:rPr lang="en-US" dirty="0"/>
-              <a:t>Cooperation</a:t>
-            </a:r>
+            <a:endParaRPr lang="en-US" dirty="0"/>
           </a:p>
           <a:p>
             <a:pPr lvl="1"/>
-            <a:r>
-              <a:rPr lang="en-US" dirty="0"/>
-              <a:t>Clarity of objectives</a:t>
-            </a:r>
-          </a:p>
-          <a:p>
-            <a:pPr lvl="1"/>
-            <a:r>
-              <a:rPr lang="en-US" dirty="0"/>
-              <a:t>Customer orientation</a:t>
-            </a:r>
-          </a:p>
-          <a:p>
-            <a:pPr lvl="1"/>
-            <a:r>
-              <a:rPr lang="en-US" dirty="0"/>
-              <a:t>Team leadership</a:t>
-            </a:r>
-          </a:p>
-          <a:p>
-            <a:pPr lvl="1"/>
-            <a:r>
-              <a:rPr lang="en-US" dirty="0"/>
-              <a:t>Competencies</a:t>
-            </a:r>
-          </a:p>
-          <a:p>
-            <a:pPr lvl="1"/>
-            <a:r>
-              <a:rPr lang="en-US" dirty="0"/>
-              <a:t>Level of future readiness</a:t>
-            </a:r>
-          </a:p>
-          <a:p>
-            <a:pPr marL="457200" lvl="1" indent="0">
-              <a:buNone/>
-            </a:pPr>
-            <a:r>
-              <a:rPr lang="en-US" dirty="0"/>
-              <a:t>Implementation: evaluate 1-5, visualize in spider chart</a:t>
-            </a:r>
+            <a:endParaRPr lang="en-US" dirty="0"/>
           </a:p>
           <a:p>
             <a:pPr lvl="1"/>
@@ -10054,7 +10403,7 @@
     </p:spTree>
     <p:extLst>
       <p:ext uri="{BB962C8B-B14F-4D97-AF65-F5344CB8AC3E}">
-        <p14:creationId xmlns:p14="http://schemas.microsoft.com/office/powerpoint/2010/main" val="4139255924"/>
+        <p14:creationId xmlns:p14="http://schemas.microsoft.com/office/powerpoint/2010/main" val="1904560094"/>
       </p:ext>
     </p:extLst>
   </p:cSld>
@@ -10104,7 +10453,7 @@
           <a:p>
             <a:r>
               <a:rPr lang="en-US" dirty="0"/>
-              <a:t>The 4 Pillars of Credibility</a:t>
+              <a:t>Teams</a:t>
             </a:r>
           </a:p>
         </p:txBody>
@@ -10127,47 +10476,109 @@
         </p:nvSpPr>
         <p:spPr/>
         <p:txBody>
-          <a:bodyPr/>
-          <a:lstStyle/>
-          <a:p>
-            <a:r>
-              <a:rPr lang="en-US" dirty="0"/>
-              <a:t>Function:</a:t>
+          <a:bodyPr>
+            <a:normAutofit lnSpcReduction="10000"/>
+          </a:bodyPr>
+          <a:lstStyle/>
+          <a:p>
+            <a:r>
+              <a:rPr lang="en-US" dirty="0"/>
+              <a:t>Dimensions to evaluate for team profiling and development</a:t>
             </a:r>
           </a:p>
           <a:p>
             <a:pPr lvl="1"/>
             <a:r>
               <a:rPr lang="en-US" dirty="0"/>
-              <a:t>Know-how: Competency in subject matter and methods</a:t>
+              <a:t>Motivation</a:t>
             </a:r>
           </a:p>
           <a:p>
             <a:pPr lvl="1"/>
             <a:r>
               <a:rPr lang="en-US" dirty="0"/>
-              <a:t>Results: Deliver on promises, track record, successes</a:t>
-            </a:r>
-          </a:p>
-          <a:p>
-            <a:r>
-              <a:rPr lang="en-US" dirty="0"/>
-              <a:t>Person:</a:t>
+              <a:t>Communication</a:t>
             </a:r>
           </a:p>
           <a:p>
             <a:pPr lvl="1"/>
             <a:r>
               <a:rPr lang="en-US" dirty="0"/>
-              <a:t>Integrity: Honesty, congruence between words, action and appearance, values</a:t>
+              <a:t>Standards of collaboration/ work ethics</a:t>
             </a:r>
           </a:p>
           <a:p>
             <a:pPr lvl="1"/>
             <a:r>
               <a:rPr lang="en-US" dirty="0"/>
-              <a:t>Intentions: Honest intentions, willingness to provide advantages to stakeholders, loyalty to the organization</a:t>
-            </a:r>
+              <a:t>Trust</a:t>
+            </a:r>
+          </a:p>
+          <a:p>
+            <a:pPr lvl="1"/>
+            <a:r>
+              <a:rPr lang="en-US" dirty="0"/>
+              <a:t>Ability to take criticism</a:t>
+            </a:r>
+          </a:p>
+          <a:p>
+            <a:pPr lvl="1"/>
+            <a:r>
+              <a:rPr lang="en-US" dirty="0"/>
+              <a:t>Cooperation</a:t>
+            </a:r>
+          </a:p>
+          <a:p>
+            <a:pPr lvl="1"/>
+            <a:r>
+              <a:rPr lang="en-US" dirty="0"/>
+              <a:t>Clarity of objectives</a:t>
+            </a:r>
+          </a:p>
+          <a:p>
+            <a:pPr lvl="1"/>
+            <a:r>
+              <a:rPr lang="en-US" dirty="0"/>
+              <a:t>Customer orientation</a:t>
+            </a:r>
+          </a:p>
+          <a:p>
+            <a:pPr lvl="1"/>
+            <a:r>
+              <a:rPr lang="en-US" dirty="0"/>
+              <a:t>Team leadership</a:t>
+            </a:r>
+          </a:p>
+          <a:p>
+            <a:pPr lvl="1"/>
+            <a:r>
+              <a:rPr lang="en-US" dirty="0"/>
+              <a:t>Competencies</a:t>
+            </a:r>
+          </a:p>
+          <a:p>
+            <a:pPr lvl="1"/>
+            <a:r>
+              <a:rPr lang="en-US" dirty="0"/>
+              <a:t>Level of future readiness</a:t>
+            </a:r>
+          </a:p>
+          <a:p>
+            <a:pPr marL="457200" lvl="1" indent="0">
+              <a:buNone/>
+            </a:pPr>
+            <a:r>
+              <a:rPr lang="en-US" dirty="0"/>
+              <a:t>Implementation: assign values from 1-5, visualize in spider chart</a:t>
+            </a:r>
+          </a:p>
+          <a:p>
+            <a:pPr lvl="1"/>
+            <a:endParaRPr lang="en-US" dirty="0"/>
+          </a:p>
+          <a:p>
+            <a:pPr lvl="1"/>
+            <a:endParaRPr lang="en-US" dirty="0"/>
           </a:p>
         </p:txBody>
       </p:sp>
@@ -10202,45 +10613,10 @@
           </a:p>
         </p:txBody>
       </p:sp>
-      <p:sp>
-        <p:nvSpPr>
-          <p:cNvPr id="7" name="TextBox 6">
-            <a:extLst>
-              <a:ext uri="{FF2B5EF4-FFF2-40B4-BE49-F238E27FC236}">
-                <a16:creationId xmlns:a16="http://schemas.microsoft.com/office/drawing/2014/main" id="{619B28A1-A3CF-5A02-794D-27CF79447D04}"/>
-              </a:ext>
-            </a:extLst>
-          </p:cNvPr>
-          <p:cNvSpPr txBox="1"/>
-          <p:nvPr/>
-        </p:nvSpPr>
-        <p:spPr>
-          <a:xfrm>
-            <a:off x="830029" y="5049943"/>
-            <a:ext cx="6096000" cy="369332"/>
-          </a:xfrm>
-          <a:prstGeom prst="rect">
-            <a:avLst/>
-          </a:prstGeom>
-          <a:noFill/>
-        </p:spPr>
-        <p:txBody>
-          <a:bodyPr wrap="square">
-            <a:spAutoFit/>
-          </a:bodyPr>
-          <a:lstStyle/>
-          <a:p>
-            <a:r>
-              <a:rPr lang="en-US" dirty="0"/>
-              <a:t>Originally established by M.R. Covey</a:t>
-            </a:r>
-          </a:p>
-        </p:txBody>
-      </p:sp>
     </p:spTree>
     <p:extLst>
       <p:ext uri="{BB962C8B-B14F-4D97-AF65-F5344CB8AC3E}">
-        <p14:creationId xmlns:p14="http://schemas.microsoft.com/office/powerpoint/2010/main" val="4104236128"/>
+        <p14:creationId xmlns:p14="http://schemas.microsoft.com/office/powerpoint/2010/main" val="4139255924"/>
       </p:ext>
     </p:extLst>
   </p:cSld>
@@ -10272,6 +10648,192 @@
           <p:cNvPr id="2" name="Title 1">
             <a:extLst>
               <a:ext uri="{FF2B5EF4-FFF2-40B4-BE49-F238E27FC236}">
+                <a16:creationId xmlns:a16="http://schemas.microsoft.com/office/drawing/2014/main" id="{E6A5A86B-5747-34FF-24D0-C181298EA89D}"/>
+              </a:ext>
+            </a:extLst>
+          </p:cNvPr>
+          <p:cNvSpPr>
+            <a:spLocks noGrp="1"/>
+          </p:cNvSpPr>
+          <p:nvPr>
+            <p:ph type="title"/>
+          </p:nvPr>
+        </p:nvSpPr>
+        <p:spPr/>
+        <p:txBody>
+          <a:bodyPr/>
+          <a:lstStyle/>
+          <a:p>
+            <a:r>
+              <a:rPr lang="en-US" dirty="0"/>
+              <a:t>The 4 Pillars of Credibility</a:t>
+            </a:r>
+          </a:p>
+        </p:txBody>
+      </p:sp>
+      <p:sp>
+        <p:nvSpPr>
+          <p:cNvPr id="3" name="Content Placeholder 2">
+            <a:extLst>
+              <a:ext uri="{FF2B5EF4-FFF2-40B4-BE49-F238E27FC236}">
+                <a16:creationId xmlns:a16="http://schemas.microsoft.com/office/drawing/2014/main" id="{FA9BBDEC-6991-56BD-FE0B-55E8B393BD8C}"/>
+              </a:ext>
+            </a:extLst>
+          </p:cNvPr>
+          <p:cNvSpPr>
+            <a:spLocks noGrp="1"/>
+          </p:cNvSpPr>
+          <p:nvPr>
+            <p:ph idx="1"/>
+          </p:nvPr>
+        </p:nvSpPr>
+        <p:spPr/>
+        <p:txBody>
+          <a:bodyPr/>
+          <a:lstStyle/>
+          <a:p>
+            <a:r>
+              <a:rPr lang="en-US" dirty="0"/>
+              <a:t>Function:</a:t>
+            </a:r>
+          </a:p>
+          <a:p>
+            <a:pPr lvl="1"/>
+            <a:r>
+              <a:rPr lang="en-US" dirty="0"/>
+              <a:t>Know-how: Competency in subject matter and methods</a:t>
+            </a:r>
+          </a:p>
+          <a:p>
+            <a:pPr lvl="1"/>
+            <a:r>
+              <a:rPr lang="en-US" dirty="0"/>
+              <a:t>Results: Deliver on promises, track record, successes</a:t>
+            </a:r>
+          </a:p>
+          <a:p>
+            <a:r>
+              <a:rPr lang="en-US" dirty="0"/>
+              <a:t>Person:</a:t>
+            </a:r>
+          </a:p>
+          <a:p>
+            <a:pPr lvl="1"/>
+            <a:r>
+              <a:rPr lang="en-US" dirty="0"/>
+              <a:t>Integrity: Honesty, congruence between words, action and appearance, values</a:t>
+            </a:r>
+          </a:p>
+          <a:p>
+            <a:pPr lvl="1"/>
+            <a:r>
+              <a:rPr lang="en-US" dirty="0"/>
+              <a:t>Intentions: Honest intentions, willingness to provide advantages to stakeholders, loyalty to the organization</a:t>
+            </a:r>
+          </a:p>
+        </p:txBody>
+      </p:sp>
+      <p:sp>
+        <p:nvSpPr>
+          <p:cNvPr id="4" name="Slide Number Placeholder 3">
+            <a:extLst>
+              <a:ext uri="{FF2B5EF4-FFF2-40B4-BE49-F238E27FC236}">
+                <a16:creationId xmlns:a16="http://schemas.microsoft.com/office/drawing/2014/main" id="{E5188A07-3DEA-0DCD-951F-43AA59D65642}"/>
+              </a:ext>
+            </a:extLst>
+          </p:cNvPr>
+          <p:cNvSpPr>
+            <a:spLocks noGrp="1"/>
+          </p:cNvSpPr>
+          <p:nvPr>
+            <p:ph type="sldNum" sz="quarter" idx="12"/>
+          </p:nvPr>
+        </p:nvSpPr>
+        <p:spPr/>
+        <p:txBody>
+          <a:bodyPr/>
+          <a:lstStyle/>
+          <a:p>
+            <a:pPr algn="l"/>
+            <a:fld id="{11CDFDCC-1F45-4E80-8B17-15DA0BDDC059}" type="slidenum">
+              <a:rPr lang="en-US" smtClean="0"/>
+              <a:pPr algn="l"/>
+              <a:t>8</a:t>
+            </a:fld>
+            <a:endParaRPr lang="en-US" dirty="0"/>
+          </a:p>
+        </p:txBody>
+      </p:sp>
+      <p:sp>
+        <p:nvSpPr>
+          <p:cNvPr id="7" name="TextBox 6">
+            <a:extLst>
+              <a:ext uri="{FF2B5EF4-FFF2-40B4-BE49-F238E27FC236}">
+                <a16:creationId xmlns:a16="http://schemas.microsoft.com/office/drawing/2014/main" id="{619B28A1-A3CF-5A02-794D-27CF79447D04}"/>
+              </a:ext>
+            </a:extLst>
+          </p:cNvPr>
+          <p:cNvSpPr txBox="1"/>
+          <p:nvPr/>
+        </p:nvSpPr>
+        <p:spPr>
+          <a:xfrm>
+            <a:off x="830029" y="5049943"/>
+            <a:ext cx="6096000" cy="369332"/>
+          </a:xfrm>
+          <a:prstGeom prst="rect">
+            <a:avLst/>
+          </a:prstGeom>
+          <a:noFill/>
+        </p:spPr>
+        <p:txBody>
+          <a:bodyPr wrap="square">
+            <a:spAutoFit/>
+          </a:bodyPr>
+          <a:lstStyle/>
+          <a:p>
+            <a:r>
+              <a:rPr lang="en-US" dirty="0"/>
+              <a:t>Originally established by M.R. Covey</a:t>
+            </a:r>
+          </a:p>
+        </p:txBody>
+      </p:sp>
+    </p:spTree>
+    <p:extLst>
+      <p:ext uri="{BB962C8B-B14F-4D97-AF65-F5344CB8AC3E}">
+        <p14:creationId xmlns:p14="http://schemas.microsoft.com/office/powerpoint/2010/main" val="4104236128"/>
+      </p:ext>
+    </p:extLst>
+  </p:cSld>
+  <p:clrMapOvr>
+    <a:masterClrMapping/>
+  </p:clrMapOvr>
+</p:sld>
+</file>
+
+<file path=ppt/slides/slide9.xml><?xml version="1.0" encoding="utf-8"?>
+<p:sld xmlns:a="http://schemas.openxmlformats.org/drawingml/2006/main" xmlns:r="http://schemas.openxmlformats.org/officeDocument/2006/relationships" xmlns:p="http://schemas.openxmlformats.org/presentationml/2006/main">
+  <p:cSld>
+    <p:spTree>
+      <p:nvGrpSpPr>
+        <p:cNvPr id="1" name=""/>
+        <p:cNvGrpSpPr/>
+        <p:nvPr/>
+      </p:nvGrpSpPr>
+      <p:grpSpPr>
+        <a:xfrm>
+          <a:off x="0" y="0"/>
+          <a:ext cx="0" cy="0"/>
+          <a:chOff x="0" y="0"/>
+          <a:chExt cx="0" cy="0"/>
+        </a:xfrm>
+      </p:grpSpPr>
+      <p:sp>
+        <p:nvSpPr>
+          <p:cNvPr id="2" name="Title 1">
+            <a:extLst>
+              <a:ext uri="{FF2B5EF4-FFF2-40B4-BE49-F238E27FC236}">
                 <a16:creationId xmlns:a16="http://schemas.microsoft.com/office/drawing/2014/main" id="{65D435A6-E959-C437-C0D5-E57709890C3B}"/>
               </a:ext>
             </a:extLst>
@@ -10320,7 +10882,7 @@
             <a:fld id="{11CDFDCC-1F45-4E80-8B17-15DA0BDDC059}" type="slidenum">
               <a:rPr lang="en-US" smtClean="0"/>
               <a:pPr algn="l"/>
-              <a:t>8</a:t>
+              <a:t>9</a:t>
             </a:fld>
             <a:endParaRPr lang="en-US" dirty="0"/>
           </a:p>
@@ -11240,164 +11802,6 @@
 </p:sld>
 </file>
 
-<file path=ppt/slides/slide9.xml><?xml version="1.0" encoding="utf-8"?>
-<p:sld xmlns:a="http://schemas.openxmlformats.org/drawingml/2006/main" xmlns:r="http://schemas.openxmlformats.org/officeDocument/2006/relationships" xmlns:p="http://schemas.openxmlformats.org/presentationml/2006/main">
-  <p:cSld>
-    <p:spTree>
-      <p:nvGrpSpPr>
-        <p:cNvPr id="1" name=""/>
-        <p:cNvGrpSpPr/>
-        <p:nvPr/>
-      </p:nvGrpSpPr>
-      <p:grpSpPr>
-        <a:xfrm>
-          <a:off x="0" y="0"/>
-          <a:ext cx="0" cy="0"/>
-          <a:chOff x="0" y="0"/>
-          <a:chExt cx="0" cy="0"/>
-        </a:xfrm>
-      </p:grpSpPr>
-      <p:sp>
-        <p:nvSpPr>
-          <p:cNvPr id="2" name="Title 1">
-            <a:extLst>
-              <a:ext uri="{FF2B5EF4-FFF2-40B4-BE49-F238E27FC236}">
-                <a16:creationId xmlns:a16="http://schemas.microsoft.com/office/drawing/2014/main" id="{41EDFC7B-CEC6-4D4F-CA77-71A6AC01BD4D}"/>
-              </a:ext>
-            </a:extLst>
-          </p:cNvPr>
-          <p:cNvSpPr>
-            <a:spLocks noGrp="1"/>
-          </p:cNvSpPr>
-          <p:nvPr>
-            <p:ph type="title"/>
-          </p:nvPr>
-        </p:nvSpPr>
-        <p:spPr/>
-        <p:txBody>
-          <a:bodyPr/>
-          <a:lstStyle/>
-          <a:p>
-            <a:r>
-              <a:rPr lang="en-US" dirty="0"/>
-              <a:t>Leadership DNA</a:t>
-            </a:r>
-          </a:p>
-        </p:txBody>
-      </p:sp>
-      <p:sp>
-        <p:nvSpPr>
-          <p:cNvPr id="3" name="Content Placeholder 2">
-            <a:extLst>
-              <a:ext uri="{FF2B5EF4-FFF2-40B4-BE49-F238E27FC236}">
-                <a16:creationId xmlns:a16="http://schemas.microsoft.com/office/drawing/2014/main" id="{45F12395-FAB7-454D-418A-7B74D59C371D}"/>
-              </a:ext>
-            </a:extLst>
-          </p:cNvPr>
-          <p:cNvSpPr>
-            <a:spLocks noGrp="1"/>
-          </p:cNvSpPr>
-          <p:nvPr>
-            <p:ph idx="1"/>
-          </p:nvPr>
-        </p:nvSpPr>
-        <p:spPr/>
-        <p:txBody>
-          <a:bodyPr>
-            <a:normAutofit fontScale="92500" lnSpcReduction="10000"/>
-          </a:bodyPr>
-          <a:lstStyle/>
-          <a:p>
-            <a:r>
-              <a:rPr lang="en-US" dirty="0"/>
-              <a:t>Personal values (e.g. hope, excellence, commitment)</a:t>
-            </a:r>
-            <a:br>
-              <a:rPr lang="en-US" dirty="0"/>
-            </a:br>
-            <a:r>
-              <a:rPr lang="en-US" dirty="0"/>
-              <a:t>Method to identify them: who are the role models that have influenced you throughout your life? What are the values associated with them? Which ones of these values have to you transferred into your life?</a:t>
-            </a:r>
-          </a:p>
-          <a:p>
-            <a:r>
-              <a:rPr lang="en-US" dirty="0"/>
-              <a:t>Strengths/Weaknesses</a:t>
-            </a:r>
-            <a:br>
-              <a:rPr lang="en-US" dirty="0"/>
-            </a:br>
-            <a:r>
-              <a:rPr lang="en-US" dirty="0"/>
-              <a:t>Method to identify them: strengths seen by you, colleagues, friends/family, when do I inspire others?</a:t>
-            </a:r>
-          </a:p>
-          <a:p>
-            <a:r>
-              <a:rPr lang="en-US" dirty="0"/>
-              <a:t>Roles</a:t>
-            </a:r>
-            <a:br>
-              <a:rPr lang="en-US" dirty="0"/>
-            </a:br>
-            <a:r>
-              <a:rPr lang="en-US" dirty="0"/>
-              <a:t>Coach, delegator, trainer, decision-maker, role model, mentor, visionary, problem solver, “Macher”, cheerleader, listener, communicator, manager, innovator, networker, supervisor, conflict manager, organizer, strategist, motivator, adaptor, influencer, goal setter, executive</a:t>
-            </a:r>
-          </a:p>
-          <a:p>
-            <a:r>
-              <a:rPr lang="en-US" dirty="0"/>
-              <a:t>Vision/ big picture</a:t>
-            </a:r>
-          </a:p>
-        </p:txBody>
-      </p:sp>
-      <p:sp>
-        <p:nvSpPr>
-          <p:cNvPr id="4" name="Slide Number Placeholder 3">
-            <a:extLst>
-              <a:ext uri="{FF2B5EF4-FFF2-40B4-BE49-F238E27FC236}">
-                <a16:creationId xmlns:a16="http://schemas.microsoft.com/office/drawing/2014/main" id="{DAFAA701-9760-DA1A-F46A-8E1512BD3F74}"/>
-              </a:ext>
-            </a:extLst>
-          </p:cNvPr>
-          <p:cNvSpPr>
-            <a:spLocks noGrp="1"/>
-          </p:cNvSpPr>
-          <p:nvPr>
-            <p:ph type="sldNum" sz="quarter" idx="12"/>
-          </p:nvPr>
-        </p:nvSpPr>
-        <p:spPr/>
-        <p:txBody>
-          <a:bodyPr/>
-          <a:lstStyle/>
-          <a:p>
-            <a:pPr algn="l"/>
-            <a:fld id="{11CDFDCC-1F45-4E80-8B17-15DA0BDDC059}" type="slidenum">
-              <a:rPr lang="en-US" smtClean="0"/>
-              <a:pPr algn="l"/>
-              <a:t>9</a:t>
-            </a:fld>
-            <a:endParaRPr lang="en-US" dirty="0"/>
-          </a:p>
-        </p:txBody>
-      </p:sp>
-    </p:spTree>
-    <p:extLst>
-      <p:ext uri="{BB962C8B-B14F-4D97-AF65-F5344CB8AC3E}">
-        <p14:creationId xmlns:p14="http://schemas.microsoft.com/office/powerpoint/2010/main" val="2487218682"/>
-      </p:ext>
-    </p:extLst>
-  </p:cSld>
-  <p:clrMapOvr>
-    <a:masterClrMapping/>
-  </p:clrMapOvr>
-</p:sld>
-</file>
-
 <file path=ppt/theme/theme1.xml><?xml version="1.0" encoding="utf-8"?>
 <a:theme xmlns:a="http://schemas.openxmlformats.org/drawingml/2006/main" name="Office Theme">
   <a:themeElements>

</xml_diff>